<commit_message>
Change BLE and adding Balance update support
</commit_message>
<xml_diff>
--- a/Software/Hitcon Badge BLE explain V1_1.pptx
+++ b/Software/Hitcon Badge BLE explain V1_1.pptx
@@ -112,6 +112,11 @@
       </a:defRPr>
     </a:lvl9pPr>
   </p:defaultTextStyle>
+  <p:extLst>
+    <p:ext uri="{EFAFB233-063F-42B5-8137-9DF3F51BA10A}">
+      <p15:sldGuideLst xmlns:p15="http://schemas.microsoft.com/office/powerpoint/2012/main"/>
+    </p:ext>
+  </p:extLst>
 </p:presentation>
 </file>
 
@@ -246,7 +251,7 @@
           <a:p>
             <a:fld id="{9C3C7798-FB07-4F5D-AE8D-7720DA8EDECA}" type="datetimeFigureOut">
               <a:rPr lang="zh-TW" altLang="en-US" smtClean="0"/>
-              <a:t>2018/6/5</a:t>
+              <a:t>2018/6/11</a:t>
             </a:fld>
             <a:endParaRPr lang="zh-TW" altLang="en-US"/>
           </a:p>
@@ -416,7 +421,7 @@
           <a:p>
             <a:fld id="{9C3C7798-FB07-4F5D-AE8D-7720DA8EDECA}" type="datetimeFigureOut">
               <a:rPr lang="zh-TW" altLang="en-US" smtClean="0"/>
-              <a:t>2018/6/5</a:t>
+              <a:t>2018/6/11</a:t>
             </a:fld>
             <a:endParaRPr lang="zh-TW" altLang="en-US"/>
           </a:p>
@@ -596,7 +601,7 @@
           <a:p>
             <a:fld id="{9C3C7798-FB07-4F5D-AE8D-7720DA8EDECA}" type="datetimeFigureOut">
               <a:rPr lang="zh-TW" altLang="en-US" smtClean="0"/>
-              <a:t>2018/6/5</a:t>
+              <a:t>2018/6/11</a:t>
             </a:fld>
             <a:endParaRPr lang="zh-TW" altLang="en-US"/>
           </a:p>
@@ -766,7 +771,7 @@
           <a:p>
             <a:fld id="{9C3C7798-FB07-4F5D-AE8D-7720DA8EDECA}" type="datetimeFigureOut">
               <a:rPr lang="zh-TW" altLang="en-US" smtClean="0"/>
-              <a:t>2018/6/5</a:t>
+              <a:t>2018/6/11</a:t>
             </a:fld>
             <a:endParaRPr lang="zh-TW" altLang="en-US"/>
           </a:p>
@@ -1012,7 +1017,7 @@
           <a:p>
             <a:fld id="{9C3C7798-FB07-4F5D-AE8D-7720DA8EDECA}" type="datetimeFigureOut">
               <a:rPr lang="zh-TW" altLang="en-US" smtClean="0"/>
-              <a:t>2018/6/5</a:t>
+              <a:t>2018/6/11</a:t>
             </a:fld>
             <a:endParaRPr lang="zh-TW" altLang="en-US"/>
           </a:p>
@@ -1244,7 +1249,7 @@
           <a:p>
             <a:fld id="{9C3C7798-FB07-4F5D-AE8D-7720DA8EDECA}" type="datetimeFigureOut">
               <a:rPr lang="zh-TW" altLang="en-US" smtClean="0"/>
-              <a:t>2018/6/5</a:t>
+              <a:t>2018/6/11</a:t>
             </a:fld>
             <a:endParaRPr lang="zh-TW" altLang="en-US"/>
           </a:p>
@@ -1611,7 +1616,7 @@
           <a:p>
             <a:fld id="{9C3C7798-FB07-4F5D-AE8D-7720DA8EDECA}" type="datetimeFigureOut">
               <a:rPr lang="zh-TW" altLang="en-US" smtClean="0"/>
-              <a:t>2018/6/5</a:t>
+              <a:t>2018/6/11</a:t>
             </a:fld>
             <a:endParaRPr lang="zh-TW" altLang="en-US"/>
           </a:p>
@@ -1729,7 +1734,7 @@
           <a:p>
             <a:fld id="{9C3C7798-FB07-4F5D-AE8D-7720DA8EDECA}" type="datetimeFigureOut">
               <a:rPr lang="zh-TW" altLang="en-US" smtClean="0"/>
-              <a:t>2018/6/5</a:t>
+              <a:t>2018/6/11</a:t>
             </a:fld>
             <a:endParaRPr lang="zh-TW" altLang="en-US"/>
           </a:p>
@@ -1824,7 +1829,7 @@
           <a:p>
             <a:fld id="{9C3C7798-FB07-4F5D-AE8D-7720DA8EDECA}" type="datetimeFigureOut">
               <a:rPr lang="zh-TW" altLang="en-US" smtClean="0"/>
-              <a:t>2018/6/5</a:t>
+              <a:t>2018/6/11</a:t>
             </a:fld>
             <a:endParaRPr lang="zh-TW" altLang="en-US"/>
           </a:p>
@@ -2101,7 +2106,7 @@
           <a:p>
             <a:fld id="{9C3C7798-FB07-4F5D-AE8D-7720DA8EDECA}" type="datetimeFigureOut">
               <a:rPr lang="zh-TW" altLang="en-US" smtClean="0"/>
-              <a:t>2018/6/5</a:t>
+              <a:t>2018/6/11</a:t>
             </a:fld>
             <a:endParaRPr lang="zh-TW" altLang="en-US"/>
           </a:p>
@@ -2354,7 +2359,7 @@
           <a:p>
             <a:fld id="{9C3C7798-FB07-4F5D-AE8D-7720DA8EDECA}" type="datetimeFigureOut">
               <a:rPr lang="zh-TW" altLang="en-US" smtClean="0"/>
-              <a:t>2018/6/5</a:t>
+              <a:t>2018/6/11</a:t>
             </a:fld>
             <a:endParaRPr lang="zh-TW" altLang="en-US"/>
           </a:p>
@@ -2567,7 +2572,7 @@
           <a:p>
             <a:fld id="{9C3C7798-FB07-4F5D-AE8D-7720DA8EDECA}" type="datetimeFigureOut">
               <a:rPr lang="zh-TW" altLang="en-US" smtClean="0"/>
-              <a:t>2018/6/5</a:t>
+              <a:t>2018/6/11</a:t>
             </a:fld>
             <a:endParaRPr lang="zh-TW" altLang="en-US"/>
           </a:p>
@@ -2993,7 +2998,11 @@
             </a:r>
             <a:r>
               <a:rPr lang="en-US" altLang="zh-TW" dirty="0" smtClean="0"/>
-              <a:t> Badge BLE explain V1.1</a:t>
+              <a:t> Badge BLE explain </a:t>
+            </a:r>
+            <a:r>
+              <a:rPr lang="en-US" altLang="zh-TW" dirty="0" smtClean="0"/>
+              <a:t>V1.2</a:t>
             </a:r>
             <a:endParaRPr lang="zh-TW" altLang="en-US" dirty="0"/>
           </a:p>
@@ -3326,7 +3335,15 @@
           <a:p>
             <a:r>
               <a:rPr lang="en-US" altLang="zh-TW" sz="1400" dirty="0" smtClean="0"/>
-              <a:t>Hitcon://?v=</a:t>
+              <a:t>Hitcon</a:t>
+            </a:r>
+            <a:r>
+              <a:rPr lang="en-US" altLang="zh-TW" sz="1400" dirty="0"/>
+              <a:t>://pair?v</a:t>
+            </a:r>
+            <a:r>
+              <a:rPr lang="en-US" altLang="zh-TW" sz="1400" dirty="0" smtClean="0"/>
+              <a:t>=</a:t>
             </a:r>
             <a:r>
               <a:rPr lang="zh-TW" altLang="en-US" sz="1400" dirty="0" smtClean="0"/>
@@ -3357,20 +3374,17 @@
           <a:p>
             <a:r>
               <a:rPr lang="en-US" altLang="zh-TW" sz="1400" dirty="0" smtClean="0"/>
-              <a:t>&amp;s=</a:t>
+              <a:t>&amp;</a:t>
+            </a:r>
+            <a:r>
+              <a:rPr lang="en-US" altLang="zh-TW" sz="1400" dirty="0" smtClean="0"/>
+              <a:t>s=</a:t>
             </a:r>
             <a:r>
               <a:rPr lang="en-US" altLang="zh-TW" sz="1400" dirty="0" err="1" smtClean="0"/>
               <a:t>ServiceUUID</a:t>
             </a:r>
-            <a:r>
-              <a:rPr lang="zh-TW" altLang="en-US" sz="1400" dirty="0" smtClean="0"/>
-              <a:t>前四個</a:t>
-            </a:r>
-            <a:r>
-              <a:rPr lang="en-US" altLang="zh-TW" sz="1400" dirty="0" smtClean="0"/>
-              <a:t>Byte</a:t>
-            </a:r>
+            <a:endParaRPr lang="en-US" altLang="zh-TW" sz="1400" dirty="0" smtClean="0"/>
           </a:p>
           <a:p>
             <a:r>
@@ -3471,16 +3485,16 @@
       </p:sp>
       <p:sp>
         <p:nvSpPr>
-          <p:cNvPr id="13" name="圓角矩形 12"/>
+          <p:cNvPr id="14" name="加號 13"/>
           <p:cNvSpPr/>
           <p:nvPr/>
         </p:nvSpPr>
         <p:spPr>
           <a:xfrm>
-            <a:off x="6790892" y="1665961"/>
-            <a:ext cx="1712422" cy="798022"/>
-          </a:xfrm>
-          <a:prstGeom prst="roundRect">
+            <a:off x="6046712" y="1881063"/>
+            <a:ext cx="357448" cy="357448"/>
+          </a:xfrm>
+          <a:prstGeom prst="mathPlus">
             <a:avLst/>
           </a:prstGeom>
         </p:spPr>
@@ -3505,34 +3519,22 @@
           <a:lstStyle/>
           <a:p>
             <a:pPr algn="ctr"/>
-            <a:r>
-              <a:rPr lang="en-US" altLang="zh-TW" dirty="0" smtClean="0"/>
-              <a:t>BLE Service UUID</a:t>
-            </a:r>
-            <a:r>
-              <a:rPr lang="zh-TW" altLang="en-US" dirty="0" smtClean="0"/>
-              <a:t>前</a:t>
-            </a:r>
-            <a:r>
-              <a:rPr lang="en-US" altLang="zh-TW" dirty="0" smtClean="0"/>
-              <a:t>4byte</a:t>
-            </a:r>
-            <a:endParaRPr lang="zh-TW" altLang="en-US" dirty="0"/>
-          </a:p>
-        </p:txBody>
-      </p:sp>
-      <p:sp>
-        <p:nvSpPr>
-          <p:cNvPr id="14" name="加號 13"/>
+            <a:endParaRPr lang="zh-TW" altLang="en-US"/>
+          </a:p>
+        </p:txBody>
+      </p:sp>
+      <p:sp>
+        <p:nvSpPr>
+          <p:cNvPr id="15" name="圓角矩形 14"/>
           <p:cNvSpPr/>
           <p:nvPr/>
         </p:nvSpPr>
         <p:spPr>
           <a:xfrm>
-            <a:off x="6046712" y="1881063"/>
-            <a:ext cx="357448" cy="357448"/>
-          </a:xfrm>
-          <a:prstGeom prst="mathPlus">
+            <a:off x="9634226" y="1665961"/>
+            <a:ext cx="1712422" cy="798022"/>
+          </a:xfrm>
+          <a:prstGeom prst="roundRect">
             <a:avLst/>
           </a:prstGeom>
         </p:spPr>
@@ -3557,22 +3559,46 @@
           <a:lstStyle/>
           <a:p>
             <a:pPr algn="ctr"/>
-            <a:endParaRPr lang="zh-TW" altLang="en-US"/>
-          </a:p>
-        </p:txBody>
-      </p:sp>
-      <p:sp>
-        <p:nvSpPr>
-          <p:cNvPr id="15" name="圓角矩形 14"/>
+            <a:r>
+              <a:rPr lang="en-US" altLang="zh-TW" dirty="0" smtClean="0"/>
+              <a:t>BLE </a:t>
+            </a:r>
+            <a:r>
+              <a:rPr lang="zh-TW" altLang="en-US" dirty="0"/>
+              <a:t>各</a:t>
+            </a:r>
+            <a:r>
+              <a:rPr lang="en-US" altLang="zh-TW" dirty="0" err="1" smtClean="0"/>
+              <a:t>charastic</a:t>
+            </a:r>
+            <a:r>
+              <a:rPr lang="en-US" altLang="zh-TW" dirty="0" smtClean="0"/>
+              <a:t> UUID</a:t>
+            </a:r>
+            <a:r>
+              <a:rPr lang="zh-TW" altLang="en-US" dirty="0" smtClean="0"/>
+              <a:t>前</a:t>
+            </a:r>
+            <a:r>
+              <a:rPr lang="en-US" altLang="zh-TW" dirty="0" smtClean="0"/>
+              <a:t>4byte</a:t>
+            </a:r>
+            <a:endParaRPr lang="zh-TW" altLang="en-US" dirty="0"/>
+          </a:p>
+        </p:txBody>
+      </p:sp>
+      <p:sp>
+        <p:nvSpPr>
+          <p:cNvPr id="16" name="加號 15"/>
           <p:cNvSpPr/>
           <p:nvPr/>
         </p:nvSpPr>
         <p:spPr>
           <a:xfrm>
-            <a:off x="9634226" y="1665961"/>
-            <a:ext cx="1712422" cy="798022"/>
-          </a:xfrm>
-          <a:prstGeom prst="roundRect">
+            <a:off x="8890046" y="1881063"/>
+            <a:ext cx="357448" cy="357448"/>
+          </a:xfrm>
+          <a:prstGeom prst="mathPlus">
             <a:avLst/>
           </a:prstGeom>
         </p:spPr>
@@ -3597,46 +3623,89 @@
           <a:lstStyle/>
           <a:p>
             <a:pPr algn="ctr"/>
-            <a:r>
-              <a:rPr lang="en-US" altLang="zh-TW" dirty="0" smtClean="0"/>
-              <a:t>BLE </a:t>
-            </a:r>
-            <a:r>
-              <a:rPr lang="zh-TW" altLang="en-US" dirty="0"/>
-              <a:t>各</a:t>
-            </a:r>
-            <a:r>
-              <a:rPr lang="en-US" altLang="zh-TW" dirty="0" err="1" smtClean="0"/>
-              <a:t>charastic</a:t>
-            </a:r>
-            <a:r>
-              <a:rPr lang="en-US" altLang="zh-TW" dirty="0" smtClean="0"/>
-              <a:t> UUID</a:t>
-            </a:r>
-            <a:r>
-              <a:rPr lang="zh-TW" altLang="en-US" dirty="0" smtClean="0"/>
-              <a:t>前</a:t>
-            </a:r>
-            <a:r>
-              <a:rPr lang="en-US" altLang="zh-TW" dirty="0" smtClean="0"/>
-              <a:t>4byte</a:t>
-            </a:r>
-            <a:endParaRPr lang="zh-TW" altLang="en-US" dirty="0"/>
-          </a:p>
-        </p:txBody>
-      </p:sp>
-      <p:sp>
-        <p:nvSpPr>
-          <p:cNvPr id="16" name="加號 15"/>
+            <a:endParaRPr lang="zh-TW" altLang="en-US"/>
+          </a:p>
+        </p:txBody>
+      </p:sp>
+      <p:sp>
+        <p:nvSpPr>
+          <p:cNvPr id="17" name="矩形 16"/>
           <p:cNvSpPr/>
           <p:nvPr/>
         </p:nvSpPr>
         <p:spPr>
           <a:xfrm>
-            <a:off x="8890046" y="1881063"/>
-            <a:ext cx="357448" cy="357448"/>
-          </a:xfrm>
-          <a:prstGeom prst="mathPlus">
+            <a:off x="7137341" y="5214927"/>
+            <a:ext cx="6096000" cy="1384995"/>
+          </a:xfrm>
+          <a:prstGeom prst="rect">
+            <a:avLst/>
+          </a:prstGeom>
+        </p:spPr>
+        <p:txBody>
+          <a:bodyPr>
+            <a:spAutoFit/>
+          </a:bodyPr>
+          <a:lstStyle/>
+          <a:p>
+            <a:r>
+              <a:rPr lang="en-US" altLang="zh-TW" sz="1400" dirty="0" smtClean="0"/>
+              <a:t>Example:</a:t>
+            </a:r>
+          </a:p>
+          <a:p>
+            <a:r>
+              <a:rPr lang="en-US" altLang="zh-TW" sz="1400" dirty="0" smtClean="0"/>
+              <a:t>Hitcon</a:t>
+            </a:r>
+            <a:r>
+              <a:rPr lang="en-US" altLang="zh-TW" sz="1400" dirty="0"/>
+              <a:t>://?v=18</a:t>
+            </a:r>
+          </a:p>
+          <a:p>
+            <a:r>
+              <a:rPr lang="en-US" altLang="zh-TW" sz="1400" dirty="0"/>
+              <a:t>&amp;a=808c2257d778e5f1340d9325116f5a7273b33f5d</a:t>
+            </a:r>
+          </a:p>
+          <a:p>
+            <a:r>
+              <a:rPr lang="en-US" altLang="zh-TW" sz="1400" dirty="0"/>
+              <a:t>&amp;k=41e77dcd1d10df31d2f143b88e563693</a:t>
+            </a:r>
+          </a:p>
+          <a:p>
+            <a:r>
+              <a:rPr lang="en-US" altLang="zh-TW" sz="1400" dirty="0"/>
+              <a:t>&amp;</a:t>
+            </a:r>
+            <a:r>
+              <a:rPr lang="en-US" altLang="zh-TW" sz="1400" dirty="0"/>
+              <a:t>s=fcf2881e-110e-4dbb-d110-4ca507163e0b</a:t>
+            </a:r>
+            <a:endParaRPr lang="en-US" altLang="zh-TW" sz="1400" dirty="0"/>
+          </a:p>
+          <a:p>
+            <a:r>
+              <a:rPr lang="en-US" altLang="zh-TW" sz="1400" dirty="0"/>
+              <a:t>&amp;c=a3ae3cde7b5e9feff77a6f0dffb017590a5527c9e8a1dc52</a:t>
+            </a:r>
+          </a:p>
+        </p:txBody>
+      </p:sp>
+      <p:sp>
+        <p:nvSpPr>
+          <p:cNvPr id="18" name="圓角矩形 17"/>
+          <p:cNvSpPr/>
+          <p:nvPr/>
+        </p:nvSpPr>
+        <p:spPr>
+          <a:xfrm>
+            <a:off x="6790892" y="1665961"/>
+            <a:ext cx="1712422" cy="798022"/>
+          </a:xfrm>
+          <a:prstGeom prst="roundRect">
             <a:avLst/>
           </a:prstGeom>
         </p:spPr>
@@ -3661,69 +3730,15 @@
           <a:lstStyle/>
           <a:p>
             <a:pPr algn="ctr"/>
-            <a:endParaRPr lang="zh-TW" altLang="en-US"/>
-          </a:p>
-        </p:txBody>
-      </p:sp>
-      <p:sp>
-        <p:nvSpPr>
-          <p:cNvPr id="17" name="矩形 16"/>
-          <p:cNvSpPr/>
-          <p:nvPr/>
-        </p:nvSpPr>
-        <p:spPr>
-          <a:xfrm>
-            <a:off x="7137341" y="5214927"/>
-            <a:ext cx="6096000" cy="1384995"/>
-          </a:xfrm>
-          <a:prstGeom prst="rect">
-            <a:avLst/>
-          </a:prstGeom>
-        </p:spPr>
-        <p:txBody>
-          <a:bodyPr>
-            <a:spAutoFit/>
-          </a:bodyPr>
-          <a:lstStyle/>
-          <a:p>
-            <a:r>
-              <a:rPr lang="en-US" altLang="zh-TW" sz="1400" dirty="0" smtClean="0"/>
-              <a:t>Example:</a:t>
-            </a:r>
-          </a:p>
-          <a:p>
-            <a:r>
-              <a:rPr lang="en-US" altLang="zh-TW" sz="1400" dirty="0" smtClean="0"/>
-              <a:t>Hitcon</a:t>
-            </a:r>
-            <a:r>
-              <a:rPr lang="en-US" altLang="zh-TW" sz="1400" dirty="0"/>
-              <a:t>://?v=18</a:t>
-            </a:r>
-          </a:p>
-          <a:p>
-            <a:r>
-              <a:rPr lang="en-US" altLang="zh-TW" sz="1400" dirty="0"/>
-              <a:t>&amp;a=808c2257d778e5f1340d9325116f5a7273b33f5d</a:t>
-            </a:r>
-          </a:p>
-          <a:p>
-            <a:r>
-              <a:rPr lang="en-US" altLang="zh-TW" sz="1400" dirty="0"/>
-              <a:t>&amp;k=41e77dcd1d10df31d2f143b88e563693</a:t>
-            </a:r>
-          </a:p>
-          <a:p>
-            <a:r>
-              <a:rPr lang="en-US" altLang="zh-TW" sz="1400" dirty="0"/>
-              <a:t>&amp;s=c49aec31</a:t>
-            </a:r>
-          </a:p>
-          <a:p>
-            <a:r>
-              <a:rPr lang="en-US" altLang="zh-TW" sz="1400" dirty="0"/>
-              <a:t>&amp;c=a3ae3cde7b5e9feff77a6f0dffb017590a5527c9e8a1dc52</a:t>
-            </a:r>
+            <a:r>
+              <a:rPr lang="en-US" altLang="zh-TW" dirty="0" smtClean="0"/>
+              <a:t>BLE Service </a:t>
+            </a:r>
+            <a:r>
+              <a:rPr lang="en-US" altLang="zh-TW" dirty="0" smtClean="0"/>
+              <a:t>UUID</a:t>
+            </a:r>
+            <a:endParaRPr lang="zh-TW" altLang="en-US" dirty="0"/>
           </a:p>
         </p:txBody>
       </p:sp>
@@ -4003,102 +4018,6 @@
       </p:sp>
       <p:sp>
         <p:nvSpPr>
-          <p:cNvPr id="10" name="文字方塊 9"/>
-          <p:cNvSpPr txBox="1"/>
-          <p:nvPr/>
-        </p:nvSpPr>
-        <p:spPr>
-          <a:xfrm>
-            <a:off x="7137341" y="3564059"/>
-            <a:ext cx="3862858" cy="1538883"/>
-          </a:xfrm>
-          <a:prstGeom prst="rect">
-            <a:avLst/>
-          </a:prstGeom>
-          <a:noFill/>
-        </p:spPr>
-        <p:txBody>
-          <a:bodyPr wrap="square" rtlCol="0">
-            <a:spAutoFit/>
-          </a:bodyPr>
-          <a:lstStyle/>
-          <a:p>
-            <a:r>
-              <a:rPr lang="zh-TW" altLang="en-US" sz="2400" dirty="0" smtClean="0"/>
-              <a:t>格式</a:t>
-            </a:r>
-            <a:r>
-              <a:rPr lang="en-US" altLang="zh-TW" sz="2400" dirty="0" smtClean="0"/>
-              <a:t>:</a:t>
-            </a:r>
-          </a:p>
-          <a:p>
-            <a:r>
-              <a:rPr lang="en-US" altLang="zh-TW" sz="1400" dirty="0" smtClean="0"/>
-              <a:t>Hitcon://?v=</a:t>
-            </a:r>
-            <a:r>
-              <a:rPr lang="zh-TW" altLang="en-US" sz="1400" dirty="0" smtClean="0"/>
-              <a:t>版本數</a:t>
-            </a:r>
-            <a:endParaRPr lang="en-US" altLang="zh-TW" sz="1400" dirty="0" smtClean="0"/>
-          </a:p>
-          <a:p>
-            <a:r>
-              <a:rPr lang="en-US" altLang="zh-TW" sz="1400" dirty="0" smtClean="0"/>
-              <a:t>&amp;a=</a:t>
-            </a:r>
-            <a:r>
-              <a:rPr lang="zh-TW" altLang="en-US" sz="1400" dirty="0" smtClean="0"/>
-              <a:t>錢包</a:t>
-            </a:r>
-            <a:r>
-              <a:rPr lang="en-US" altLang="zh-TW" sz="1400" dirty="0" smtClean="0"/>
-              <a:t>Address</a:t>
-            </a:r>
-          </a:p>
-          <a:p>
-            <a:r>
-              <a:rPr lang="en-US" altLang="zh-TW" sz="1400" dirty="0" smtClean="0"/>
-              <a:t>&amp;k=AES Key</a:t>
-            </a:r>
-          </a:p>
-          <a:p>
-            <a:r>
-              <a:rPr lang="en-US" altLang="zh-TW" sz="1400" dirty="0" smtClean="0"/>
-              <a:t>&amp;s=</a:t>
-            </a:r>
-            <a:r>
-              <a:rPr lang="en-US" altLang="zh-TW" sz="1400" dirty="0" err="1" smtClean="0"/>
-              <a:t>ServiceUUID</a:t>
-            </a:r>
-            <a:r>
-              <a:rPr lang="zh-TW" altLang="en-US" sz="1400" dirty="0" smtClean="0"/>
-              <a:t>前四個</a:t>
-            </a:r>
-            <a:r>
-              <a:rPr lang="en-US" altLang="zh-TW" sz="1400" dirty="0" smtClean="0"/>
-              <a:t>Byte</a:t>
-            </a:r>
-          </a:p>
-          <a:p>
-            <a:r>
-              <a:rPr lang="en-US" altLang="zh-TW" sz="1400" dirty="0" smtClean="0"/>
-              <a:t>&amp;c=Characteristic</a:t>
-            </a:r>
-            <a:r>
-              <a:rPr lang="zh-TW" altLang="en-US" sz="1400" dirty="0" smtClean="0"/>
-              <a:t>前四個</a:t>
-            </a:r>
-            <a:r>
-              <a:rPr lang="en-US" altLang="zh-TW" sz="1400" dirty="0" smtClean="0"/>
-              <a:t>Byte[6]</a:t>
-            </a:r>
-          </a:p>
-        </p:txBody>
-      </p:sp>
-      <p:sp>
-        <p:nvSpPr>
           <p:cNvPr id="11" name="文字方塊 10"/>
           <p:cNvSpPr txBox="1"/>
           <p:nvPr/>
@@ -4216,15 +4135,11 @@
             <a:pPr algn="ctr"/>
             <a:r>
               <a:rPr lang="en-US" altLang="zh-TW" dirty="0" smtClean="0"/>
-              <a:t>BLE Service UUID</a:t>
-            </a:r>
-            <a:r>
-              <a:rPr lang="zh-TW" altLang="en-US" dirty="0" smtClean="0"/>
-              <a:t>前</a:t>
-            </a:r>
-            <a:r>
-              <a:rPr lang="en-US" altLang="zh-TW" dirty="0" smtClean="0"/>
-              <a:t>4byte</a:t>
+              <a:t>BLE Service </a:t>
+            </a:r>
+            <a:r>
+              <a:rPr lang="en-US" altLang="zh-TW" dirty="0" smtClean="0"/>
+              <a:t>UUID</a:t>
             </a:r>
             <a:endParaRPr lang="zh-TW" altLang="en-US" dirty="0"/>
           </a:p>
@@ -4376,7 +4291,108 @@
       </p:sp>
       <p:sp>
         <p:nvSpPr>
-          <p:cNvPr id="17" name="矩形 16"/>
+          <p:cNvPr id="18" name="文字方塊 17"/>
+          <p:cNvSpPr txBox="1"/>
+          <p:nvPr/>
+        </p:nvSpPr>
+        <p:spPr>
+          <a:xfrm>
+            <a:off x="7137341" y="3564059"/>
+            <a:ext cx="3862858" cy="1538883"/>
+          </a:xfrm>
+          <a:prstGeom prst="rect">
+            <a:avLst/>
+          </a:prstGeom>
+          <a:noFill/>
+        </p:spPr>
+        <p:txBody>
+          <a:bodyPr wrap="square" rtlCol="0">
+            <a:spAutoFit/>
+          </a:bodyPr>
+          <a:lstStyle/>
+          <a:p>
+            <a:r>
+              <a:rPr lang="zh-TW" altLang="en-US" sz="2400" dirty="0" smtClean="0"/>
+              <a:t>格式</a:t>
+            </a:r>
+            <a:r>
+              <a:rPr lang="en-US" altLang="zh-TW" sz="2400" dirty="0" smtClean="0"/>
+              <a:t>:</a:t>
+            </a:r>
+          </a:p>
+          <a:p>
+            <a:r>
+              <a:rPr lang="en-US" altLang="zh-TW" sz="1400" dirty="0" smtClean="0"/>
+              <a:t>Hitcon</a:t>
+            </a:r>
+            <a:r>
+              <a:rPr lang="en-US" altLang="zh-TW" sz="1400" dirty="0"/>
+              <a:t>://pair?v</a:t>
+            </a:r>
+            <a:r>
+              <a:rPr lang="en-US" altLang="zh-TW" sz="1400" dirty="0" smtClean="0"/>
+              <a:t>=</a:t>
+            </a:r>
+            <a:r>
+              <a:rPr lang="zh-TW" altLang="en-US" sz="1400" dirty="0" smtClean="0"/>
+              <a:t>版本數</a:t>
+            </a:r>
+            <a:endParaRPr lang="en-US" altLang="zh-TW" sz="1400" dirty="0" smtClean="0"/>
+          </a:p>
+          <a:p>
+            <a:r>
+              <a:rPr lang="en-US" altLang="zh-TW" sz="1400" dirty="0" smtClean="0"/>
+              <a:t>&amp;a=</a:t>
+            </a:r>
+            <a:r>
+              <a:rPr lang="zh-TW" altLang="en-US" sz="1400" dirty="0" smtClean="0"/>
+              <a:t>錢包</a:t>
+            </a:r>
+            <a:r>
+              <a:rPr lang="en-US" altLang="zh-TW" sz="1400" dirty="0" smtClean="0"/>
+              <a:t>Address</a:t>
+            </a:r>
+          </a:p>
+          <a:p>
+            <a:r>
+              <a:rPr lang="en-US" altLang="zh-TW" sz="1400" dirty="0" smtClean="0"/>
+              <a:t>&amp;k=AES Key</a:t>
+            </a:r>
+          </a:p>
+          <a:p>
+            <a:r>
+              <a:rPr lang="en-US" altLang="zh-TW" sz="1400" dirty="0" smtClean="0"/>
+              <a:t>&amp;</a:t>
+            </a:r>
+            <a:r>
+              <a:rPr lang="en-US" altLang="zh-TW" sz="1400" dirty="0" smtClean="0"/>
+              <a:t>s=</a:t>
+            </a:r>
+            <a:r>
+              <a:rPr lang="en-US" altLang="zh-TW" sz="1400" dirty="0" err="1" smtClean="0"/>
+              <a:t>ServiceUUID</a:t>
+            </a:r>
+            <a:endParaRPr lang="en-US" altLang="zh-TW" sz="1400" dirty="0" smtClean="0"/>
+          </a:p>
+          <a:p>
+            <a:r>
+              <a:rPr lang="en-US" altLang="zh-TW" sz="1400" dirty="0" smtClean="0"/>
+              <a:t>&amp;c=Characteristic</a:t>
+            </a:r>
+            <a:r>
+              <a:rPr lang="zh-TW" altLang="en-US" sz="1400" dirty="0" smtClean="0"/>
+              <a:t>前四個</a:t>
+            </a:r>
+            <a:r>
+              <a:rPr lang="en-US" altLang="zh-TW" sz="1400" dirty="0" smtClean="0"/>
+              <a:t>Byte[6]</a:t>
+            </a:r>
+          </a:p>
+        </p:txBody>
+      </p:sp>
+      <p:sp>
+        <p:nvSpPr>
+          <p:cNvPr id="19" name="矩形 18"/>
           <p:cNvSpPr/>
           <p:nvPr/>
         </p:nvSpPr>
@@ -4425,8 +4441,13 @@
           <a:p>
             <a:r>
               <a:rPr lang="en-US" altLang="zh-TW" sz="1400" dirty="0"/>
-              <a:t>&amp;s=c49aec31</a:t>
-            </a:r>
+              <a:t>&amp;</a:t>
+            </a:r>
+            <a:r>
+              <a:rPr lang="en-US" altLang="zh-TW" sz="1400" dirty="0"/>
+              <a:t>s=fcf2881e-110e-4dbb-d110-4ca507163e0b</a:t>
+            </a:r>
+            <a:endParaRPr lang="en-US" altLang="zh-TW" sz="1400" dirty="0"/>
           </a:p>
           <a:p>
             <a:r>
@@ -4505,7 +4526,7 @@
         <p:spPr>
           <a:xfrm>
             <a:off x="912684" y="1315234"/>
-            <a:ext cx="7000634" cy="1569660"/>
+            <a:ext cx="9734716" cy="1569660"/>
           </a:xfrm>
           <a:prstGeom prst="rect">
             <a:avLst/>
@@ -4547,11 +4568,19 @@
             </a:r>
             <a:r>
               <a:rPr lang="zh-TW" altLang="en-US" sz="2400" dirty="0" smtClean="0"/>
-              <a:t>會寫</a:t>
+              <a:t>會</a:t>
+            </a:r>
+            <a:r>
+              <a:rPr lang="zh-TW" altLang="en-US" sz="2400" dirty="0" smtClean="0"/>
+              <a:t>寫</a:t>
+            </a:r>
+            <a:r>
+              <a:rPr lang="en-US" altLang="zh-TW" sz="2400" dirty="0"/>
+              <a:t>Characteristic </a:t>
             </a:r>
             <a:r>
               <a:rPr lang="en-US" altLang="zh-TW" sz="2400" dirty="0" smtClean="0"/>
-              <a:t>UUID</a:t>
+              <a:t> UUID</a:t>
             </a:r>
             <a:r>
               <a:rPr lang="zh-TW" altLang="en-US" sz="2400" dirty="0" smtClean="0"/>
@@ -4569,6 +4598,55 @@
               <a:rPr lang="en-US" altLang="zh-TW" sz="2400" dirty="0" smtClean="0"/>
               <a:t>Byte</a:t>
             </a:r>
+            <a:r>
+              <a:rPr lang="zh-TW" altLang="en-US" sz="2400" dirty="0" smtClean="0"/>
+              <a:t>，</a:t>
+            </a:r>
+            <a:r>
+              <a:rPr lang="zh-TW" altLang="en-US" sz="2400" dirty="0" smtClean="0">
+                <a:solidFill>
+                  <a:srgbClr val="FF0000"/>
+                </a:solidFill>
+              </a:rPr>
+              <a:t>後面的</a:t>
+            </a:r>
+            <a:r>
+              <a:rPr lang="en-US" altLang="zh-TW" sz="2400" dirty="0" smtClean="0">
+                <a:solidFill>
+                  <a:srgbClr val="FF0000"/>
+                </a:solidFill>
+              </a:rPr>
+              <a:t>UUID</a:t>
+            </a:r>
+            <a:r>
+              <a:rPr lang="zh-TW" altLang="en-US" sz="2400" dirty="0" smtClean="0">
+                <a:solidFill>
+                  <a:srgbClr val="FF0000"/>
+                </a:solidFill>
+              </a:rPr>
+              <a:t>與</a:t>
+            </a:r>
+            <a:r>
+              <a:rPr lang="en-US" altLang="zh-TW" sz="2400" dirty="0" smtClean="0">
+                <a:solidFill>
+                  <a:srgbClr val="FF0000"/>
+                </a:solidFill>
+              </a:rPr>
+              <a:t>Service</a:t>
+            </a:r>
+            <a:r>
+              <a:rPr lang="zh-TW" altLang="en-US" sz="2400" dirty="0" smtClean="0">
+                <a:solidFill>
+                  <a:srgbClr val="FF0000"/>
+                </a:solidFill>
+              </a:rPr>
+              <a:t>相同</a:t>
+            </a:r>
+            <a:endParaRPr lang="en-US" altLang="zh-TW" sz="2400" dirty="0" smtClean="0">
+              <a:solidFill>
+                <a:srgbClr val="FF0000"/>
+              </a:solidFill>
+            </a:endParaRPr>
           </a:p>
           <a:p>
             <a:r>
@@ -4986,16 +5064,11 @@
               <a:rPr lang="en-US" altLang="zh-TW" dirty="0" smtClean="0"/>
               <a:t>5.TransferFrom Method</a:t>
             </a:r>
-            <a:endParaRPr lang="en-US" altLang="zh-TW" dirty="0" smtClean="0"/>
-          </a:p>
-          <a:p>
-            <a:r>
-              <a:rPr lang="en-US" altLang="zh-TW" dirty="0" smtClean="0"/>
-              <a:t>6</a:t>
-            </a:r>
-            <a:r>
-              <a:rPr lang="en-US" altLang="zh-TW" dirty="0" smtClean="0"/>
-              <a:t>.Approve Method</a:t>
+          </a:p>
+          <a:p>
+            <a:r>
+              <a:rPr lang="en-US" altLang="zh-TW" dirty="0" smtClean="0"/>
+              <a:t>6.Approve Method</a:t>
             </a:r>
           </a:p>
           <a:p>
@@ -5094,11 +5167,7 @@
           <a:p>
             <a:r>
               <a:rPr lang="en-US" altLang="zh-TW" dirty="0" smtClean="0"/>
-              <a:t>Header(uint8_t)	 length(uint8_t)	</a:t>
-            </a:r>
-            <a:r>
-              <a:rPr lang="en-US" altLang="zh-TW" dirty="0" smtClean="0"/>
-              <a:t>Data[</a:t>
+              <a:t>Header(uint8_t)	 length(uint8_t)	Data[</a:t>
             </a:r>
             <a:r>
               <a:rPr lang="en-US" altLang="zh-TW" dirty="0" err="1" smtClean="0"/>
@@ -5108,7 +5177,6 @@
               <a:rPr lang="en-US" altLang="zh-TW" dirty="0" smtClean="0"/>
               <a:t>]</a:t>
             </a:r>
-            <a:endParaRPr lang="en-US" altLang="zh-TW" dirty="0" smtClean="0"/>
           </a:p>
           <a:p>
             <a:r>
@@ -5129,7 +5197,6 @@
               <a:rPr lang="en-US" altLang="zh-TW" dirty="0" smtClean="0"/>
               <a:t>Method]</a:t>
             </a:r>
-            <a:endParaRPr lang="en-US" altLang="zh-TW" dirty="0" smtClean="0"/>
           </a:p>
           <a:p>
             <a:r>
@@ -5257,15 +5324,7 @@
             <a:pPr algn="ctr"/>
             <a:r>
               <a:rPr lang="en-US" altLang="zh-TW" dirty="0" smtClean="0"/>
-              <a:t>Write to </a:t>
-            </a:r>
-            <a:r>
-              <a:rPr lang="en-US" altLang="zh-TW" dirty="0" smtClean="0"/>
-              <a:t>AddERC20</a:t>
-            </a:r>
-            <a:r>
-              <a:rPr lang="en-US" altLang="zh-TW" dirty="0" smtClean="0"/>
-              <a:t> </a:t>
+              <a:t>Write to AddERC20 </a:t>
             </a:r>
             <a:r>
               <a:rPr lang="en-US" altLang="zh-TW" dirty="0" err="1" smtClean="0"/>
@@ -5396,7 +5455,6 @@
               <a:rPr lang="en-US" altLang="zh-TW" dirty="0" smtClean="0"/>
               <a:t>5.Noice</a:t>
             </a:r>
-            <a:endParaRPr lang="en-US" altLang="zh-TW" dirty="0" smtClean="0"/>
           </a:p>
           <a:p>
             <a:r>
@@ -5407,7 +5465,6 @@
               <a:rPr lang="en-US" altLang="zh-TW" dirty="0" smtClean="0"/>
               <a:t>.Data</a:t>
             </a:r>
-            <a:endParaRPr lang="en-US" altLang="zh-TW" dirty="0" smtClean="0"/>
           </a:p>
         </p:txBody>
       </p:sp>
@@ -5494,11 +5551,7 @@
           <a:p>
             <a:r>
               <a:rPr lang="en-US" altLang="zh-TW" dirty="0" smtClean="0"/>
-              <a:t>Header(uint8_t)	 length(uint8_t)	</a:t>
-            </a:r>
-            <a:r>
-              <a:rPr lang="en-US" altLang="zh-TW" dirty="0" smtClean="0"/>
-              <a:t>Data[</a:t>
+              <a:t>Header(uint8_t)	 length(uint8_t)	Data[</a:t>
             </a:r>
             <a:r>
               <a:rPr lang="en-US" altLang="zh-TW" dirty="0" err="1" smtClean="0"/>
@@ -5508,7 +5561,6 @@
               <a:rPr lang="en-US" altLang="zh-TW" dirty="0" smtClean="0"/>
               <a:t>]</a:t>
             </a:r>
-            <a:endParaRPr lang="en-US" altLang="zh-TW" dirty="0" smtClean="0"/>
           </a:p>
           <a:p>
             <a:r>
@@ -6033,11 +6085,7 @@
           <a:p>
             <a:r>
               <a:rPr lang="en-US" altLang="zh-TW" dirty="0" smtClean="0"/>
-              <a:t>Header(uint8_t)	 length(uint8_t)	</a:t>
-            </a:r>
-            <a:r>
-              <a:rPr lang="en-US" altLang="zh-TW" dirty="0" smtClean="0"/>
-              <a:t>Data[</a:t>
+              <a:t>Header(uint8_t)	 length(uint8_t)	Data[</a:t>
             </a:r>
             <a:r>
               <a:rPr lang="en-US" altLang="zh-TW" dirty="0" err="1" smtClean="0"/>
@@ -6047,7 +6095,6 @@
               <a:rPr lang="en-US" altLang="zh-TW" dirty="0" smtClean="0"/>
               <a:t>]</a:t>
             </a:r>
-            <a:endParaRPr lang="en-US" altLang="zh-TW" dirty="0" smtClean="0"/>
           </a:p>
           <a:p>
             <a:r>
@@ -6413,7 +6460,6 @@
               <a:rPr lang="en-US" altLang="zh-TW" dirty="0" smtClean="0"/>
               <a:t>5.Noice</a:t>
             </a:r>
-            <a:endParaRPr lang="en-US" altLang="zh-TW" dirty="0" smtClean="0"/>
           </a:p>
           <a:p>
             <a:r>
@@ -6424,7 +6470,6 @@
               <a:rPr lang="en-US" altLang="zh-TW" dirty="0" smtClean="0"/>
               <a:t>.Data</a:t>
             </a:r>
-            <a:endParaRPr lang="en-US" altLang="zh-TW" dirty="0" smtClean="0"/>
           </a:p>
         </p:txBody>
       </p:sp>
@@ -6797,11 +6842,7 @@
           <a:p>
             <a:r>
               <a:rPr lang="en-US" altLang="zh-TW" dirty="0" smtClean="0"/>
-              <a:t>Header(uint8_t)	 length(uint8_t)	</a:t>
-            </a:r>
-            <a:r>
-              <a:rPr lang="en-US" altLang="zh-TW" dirty="0" smtClean="0"/>
-              <a:t>Data[</a:t>
+              <a:t>Header(uint8_t)	 length(uint8_t)	Data[</a:t>
             </a:r>
             <a:r>
               <a:rPr lang="en-US" altLang="zh-TW" dirty="0" err="1" smtClean="0"/>
@@ -6811,7 +6852,6 @@
               <a:rPr lang="en-US" altLang="zh-TW" dirty="0" smtClean="0"/>
               <a:t>]</a:t>
             </a:r>
-            <a:endParaRPr lang="en-US" altLang="zh-TW" dirty="0" smtClean="0"/>
           </a:p>
           <a:p>
             <a:r>
@@ -6830,8 +6870,8 @@
               <a:t>0x02	</a:t>
             </a:r>
             <a:r>
-              <a:rPr lang="en-US" altLang="zh-TW" dirty="0" err="1" smtClean="0"/>
-              <a:t>Value_len</a:t>
+              <a:rPr lang="en-US" altLang="zh-TW" dirty="0" smtClean="0"/>
+              <a:t>0x04</a:t>
             </a:r>
             <a:r>
               <a:rPr lang="en-US" altLang="zh-TW" dirty="0"/>
@@ -6839,8 +6879,9 @@
             </a:r>
             <a:r>
               <a:rPr lang="en-US" altLang="zh-TW" dirty="0" smtClean="0"/>
-              <a:t>Value</a:t>
-            </a:r>
+              <a:t>	Value</a:t>
+            </a:r>
+            <a:endParaRPr lang="en-US" altLang="zh-TW" dirty="0" smtClean="0"/>
           </a:p>
         </p:txBody>
       </p:sp>
@@ -7005,6 +7046,59 @@
               <a:rPr lang="en-US" altLang="zh-TW" dirty="0" smtClean="0"/>
               <a:t>2.Value</a:t>
             </a:r>
+          </a:p>
+        </p:txBody>
+      </p:sp>
+      <p:sp>
+        <p:nvSpPr>
+          <p:cNvPr id="2" name="矩形 1"/>
+          <p:cNvSpPr/>
+          <p:nvPr/>
+        </p:nvSpPr>
+        <p:spPr>
+          <a:xfrm>
+            <a:off x="659607" y="4915462"/>
+            <a:ext cx="3159839" cy="369332"/>
+          </a:xfrm>
+          <a:prstGeom prst="rect">
+            <a:avLst/>
+          </a:prstGeom>
+        </p:spPr>
+        <p:txBody>
+          <a:bodyPr wrap="none">
+            <a:spAutoFit/>
+          </a:bodyPr>
+          <a:lstStyle/>
+          <a:p>
+            <a:r>
+              <a:rPr lang="en-US" altLang="zh-TW" dirty="0" smtClean="0"/>
+              <a:t>Value = </a:t>
+            </a:r>
+            <a:r>
+              <a:rPr lang="zh-TW" altLang="en-US" dirty="0" smtClean="0"/>
+              <a:t>四位</a:t>
+            </a:r>
+            <a:r>
+              <a:rPr lang="en-US" altLang="zh-TW" dirty="0" smtClean="0"/>
+              <a:t>ASCII</a:t>
+            </a:r>
+            <a:r>
+              <a:rPr lang="zh-TW" altLang="en-US" dirty="0" smtClean="0"/>
+              <a:t>的數字</a:t>
+            </a:r>
+            <a:r>
+              <a:rPr lang="en-US" altLang="zh-TW" dirty="0" smtClean="0"/>
+              <a:t>(</a:t>
+            </a:r>
+            <a:r>
+              <a:rPr lang="zh-TW" altLang="en-US" dirty="0" smtClean="0"/>
+              <a:t>暫定</a:t>
+            </a:r>
+            <a:r>
+              <a:rPr lang="en-US" altLang="zh-TW" dirty="0" smtClean="0"/>
+              <a:t>)</a:t>
+            </a:r>
+            <a:endParaRPr lang="zh-TW" altLang="en-US" dirty="0"/>
           </a:p>
         </p:txBody>
       </p:sp>
@@ -7192,11 +7286,7 @@
           <a:p>
             <a:r>
               <a:rPr lang="en-US" altLang="zh-TW" dirty="0" smtClean="0"/>
-              <a:t>Header(uint8_t)	 length(uint8_t)	</a:t>
-            </a:r>
-            <a:r>
-              <a:rPr lang="en-US" altLang="zh-TW" dirty="0" smtClean="0"/>
-              <a:t>Data[</a:t>
+              <a:t>Header(uint8_t)	 length(uint8_t)	Data[</a:t>
             </a:r>
             <a:r>
               <a:rPr lang="en-US" altLang="zh-TW" dirty="0" err="1" smtClean="0"/>
@@ -7206,20 +7296,11 @@
               <a:rPr lang="en-US" altLang="zh-TW" dirty="0" smtClean="0"/>
               <a:t>]</a:t>
             </a:r>
-            <a:endParaRPr lang="en-US" altLang="zh-TW" dirty="0" smtClean="0"/>
-          </a:p>
-          <a:p>
-            <a:r>
-              <a:rPr lang="en-US" altLang="zh-TW" dirty="0" smtClean="0"/>
-              <a:t>0x01	0x14		</a:t>
-            </a:r>
-            <a:r>
-              <a:rPr lang="en-US" altLang="zh-TW" dirty="0" smtClean="0"/>
-              <a:t>Contract </a:t>
-            </a:r>
-            <a:r>
-              <a:rPr lang="en-US" altLang="zh-TW" dirty="0" smtClean="0"/>
-              <a:t>Address</a:t>
+          </a:p>
+          <a:p>
+            <a:r>
+              <a:rPr lang="en-US" altLang="zh-TW" dirty="0" smtClean="0"/>
+              <a:t>0x01	0x14		Contract Address</a:t>
             </a:r>
           </a:p>
           <a:p>
@@ -7408,6 +7489,59 @@
               <a:t>Balance_Gatt</a:t>
             </a:r>
             <a:endParaRPr lang="en-US" altLang="zh-TW" dirty="0" smtClean="0"/>
+          </a:p>
+        </p:txBody>
+      </p:sp>
+      <p:sp>
+        <p:nvSpPr>
+          <p:cNvPr id="12" name="矩形 11"/>
+          <p:cNvSpPr/>
+          <p:nvPr/>
+        </p:nvSpPr>
+        <p:spPr>
+          <a:xfrm>
+            <a:off x="659607" y="4915462"/>
+            <a:ext cx="3159839" cy="369332"/>
+          </a:xfrm>
+          <a:prstGeom prst="rect">
+            <a:avLst/>
+          </a:prstGeom>
+        </p:spPr>
+        <p:txBody>
+          <a:bodyPr wrap="none">
+            <a:spAutoFit/>
+          </a:bodyPr>
+          <a:lstStyle/>
+          <a:p>
+            <a:r>
+              <a:rPr lang="en-US" altLang="zh-TW" dirty="0" smtClean="0"/>
+              <a:t>Value = </a:t>
+            </a:r>
+            <a:r>
+              <a:rPr lang="zh-TW" altLang="en-US" dirty="0" smtClean="0"/>
+              <a:t>四位</a:t>
+            </a:r>
+            <a:r>
+              <a:rPr lang="en-US" altLang="zh-TW" dirty="0" smtClean="0"/>
+              <a:t>ASCII</a:t>
+            </a:r>
+            <a:r>
+              <a:rPr lang="zh-TW" altLang="en-US" dirty="0" smtClean="0"/>
+              <a:t>的數字</a:t>
+            </a:r>
+            <a:r>
+              <a:rPr lang="en-US" altLang="zh-TW" dirty="0" smtClean="0"/>
+              <a:t>(</a:t>
+            </a:r>
+            <a:r>
+              <a:rPr lang="zh-TW" altLang="en-US" dirty="0" smtClean="0"/>
+              <a:t>暫定</a:t>
+            </a:r>
+            <a:r>
+              <a:rPr lang="en-US" altLang="zh-TW" dirty="0" smtClean="0"/>
+              <a:t>)</a:t>
+            </a:r>
+            <a:endParaRPr lang="zh-TW" altLang="en-US" dirty="0"/>
           </a:p>
         </p:txBody>
       </p:sp>

</xml_diff>

<commit_message>
adding Upload tools and update main program and BLE with bin file
</commit_message>
<xml_diff>
--- a/Software/Hitcon Badge BLE explain V1_1.pptx
+++ b/Software/Hitcon Badge BLE explain V1_1.pptx
@@ -251,7 +251,7 @@
           <a:p>
             <a:fld id="{9C3C7798-FB07-4F5D-AE8D-7720DA8EDECA}" type="datetimeFigureOut">
               <a:rPr lang="zh-TW" altLang="en-US" smtClean="0"/>
-              <a:t>2018/6/11</a:t>
+              <a:t>2018/6/18</a:t>
             </a:fld>
             <a:endParaRPr lang="zh-TW" altLang="en-US"/>
           </a:p>
@@ -421,7 +421,7 @@
           <a:p>
             <a:fld id="{9C3C7798-FB07-4F5D-AE8D-7720DA8EDECA}" type="datetimeFigureOut">
               <a:rPr lang="zh-TW" altLang="en-US" smtClean="0"/>
-              <a:t>2018/6/11</a:t>
+              <a:t>2018/6/18</a:t>
             </a:fld>
             <a:endParaRPr lang="zh-TW" altLang="en-US"/>
           </a:p>
@@ -601,7 +601,7 @@
           <a:p>
             <a:fld id="{9C3C7798-FB07-4F5D-AE8D-7720DA8EDECA}" type="datetimeFigureOut">
               <a:rPr lang="zh-TW" altLang="en-US" smtClean="0"/>
-              <a:t>2018/6/11</a:t>
+              <a:t>2018/6/18</a:t>
             </a:fld>
             <a:endParaRPr lang="zh-TW" altLang="en-US"/>
           </a:p>
@@ -771,7 +771,7 @@
           <a:p>
             <a:fld id="{9C3C7798-FB07-4F5D-AE8D-7720DA8EDECA}" type="datetimeFigureOut">
               <a:rPr lang="zh-TW" altLang="en-US" smtClean="0"/>
-              <a:t>2018/6/11</a:t>
+              <a:t>2018/6/18</a:t>
             </a:fld>
             <a:endParaRPr lang="zh-TW" altLang="en-US"/>
           </a:p>
@@ -1017,7 +1017,7 @@
           <a:p>
             <a:fld id="{9C3C7798-FB07-4F5D-AE8D-7720DA8EDECA}" type="datetimeFigureOut">
               <a:rPr lang="zh-TW" altLang="en-US" smtClean="0"/>
-              <a:t>2018/6/11</a:t>
+              <a:t>2018/6/18</a:t>
             </a:fld>
             <a:endParaRPr lang="zh-TW" altLang="en-US"/>
           </a:p>
@@ -1249,7 +1249,7 @@
           <a:p>
             <a:fld id="{9C3C7798-FB07-4F5D-AE8D-7720DA8EDECA}" type="datetimeFigureOut">
               <a:rPr lang="zh-TW" altLang="en-US" smtClean="0"/>
-              <a:t>2018/6/11</a:t>
+              <a:t>2018/6/18</a:t>
             </a:fld>
             <a:endParaRPr lang="zh-TW" altLang="en-US"/>
           </a:p>
@@ -1616,7 +1616,7 @@
           <a:p>
             <a:fld id="{9C3C7798-FB07-4F5D-AE8D-7720DA8EDECA}" type="datetimeFigureOut">
               <a:rPr lang="zh-TW" altLang="en-US" smtClean="0"/>
-              <a:t>2018/6/11</a:t>
+              <a:t>2018/6/18</a:t>
             </a:fld>
             <a:endParaRPr lang="zh-TW" altLang="en-US"/>
           </a:p>
@@ -1734,7 +1734,7 @@
           <a:p>
             <a:fld id="{9C3C7798-FB07-4F5D-AE8D-7720DA8EDECA}" type="datetimeFigureOut">
               <a:rPr lang="zh-TW" altLang="en-US" smtClean="0"/>
-              <a:t>2018/6/11</a:t>
+              <a:t>2018/6/18</a:t>
             </a:fld>
             <a:endParaRPr lang="zh-TW" altLang="en-US"/>
           </a:p>
@@ -1829,7 +1829,7 @@
           <a:p>
             <a:fld id="{9C3C7798-FB07-4F5D-AE8D-7720DA8EDECA}" type="datetimeFigureOut">
               <a:rPr lang="zh-TW" altLang="en-US" smtClean="0"/>
-              <a:t>2018/6/11</a:t>
+              <a:t>2018/6/18</a:t>
             </a:fld>
             <a:endParaRPr lang="zh-TW" altLang="en-US"/>
           </a:p>
@@ -2106,7 +2106,7 @@
           <a:p>
             <a:fld id="{9C3C7798-FB07-4F5D-AE8D-7720DA8EDECA}" type="datetimeFigureOut">
               <a:rPr lang="zh-TW" altLang="en-US" smtClean="0"/>
-              <a:t>2018/6/11</a:t>
+              <a:t>2018/6/18</a:t>
             </a:fld>
             <a:endParaRPr lang="zh-TW" altLang="en-US"/>
           </a:p>
@@ -2359,7 +2359,7 @@
           <a:p>
             <a:fld id="{9C3C7798-FB07-4F5D-AE8D-7720DA8EDECA}" type="datetimeFigureOut">
               <a:rPr lang="zh-TW" altLang="en-US" smtClean="0"/>
-              <a:t>2018/6/11</a:t>
+              <a:t>2018/6/18</a:t>
             </a:fld>
             <a:endParaRPr lang="zh-TW" altLang="en-US"/>
           </a:p>
@@ -2572,7 +2572,7 @@
           <a:p>
             <a:fld id="{9C3C7798-FB07-4F5D-AE8D-7720DA8EDECA}" type="datetimeFigureOut">
               <a:rPr lang="zh-TW" altLang="en-US" smtClean="0"/>
-              <a:t>2018/6/11</a:t>
+              <a:t>2018/6/18</a:t>
             </a:fld>
             <a:endParaRPr lang="zh-TW" altLang="en-US"/>
           </a:p>
@@ -3002,7 +3002,7 @@
             </a:r>
             <a:r>
               <a:rPr lang="en-US" altLang="zh-TW" dirty="0" smtClean="0"/>
-              <a:t>V1.2</a:t>
+              <a:t>V1.3</a:t>
             </a:r>
             <a:endParaRPr lang="zh-TW" altLang="en-US" dirty="0"/>
           </a:p>
@@ -3065,7 +3065,7 @@
         </p:nvSpPr>
         <p:spPr>
           <a:xfrm>
-            <a:off x="1104224" y="1665961"/>
+            <a:off x="448887" y="1427967"/>
             <a:ext cx="1712422" cy="798022"/>
           </a:xfrm>
           <a:prstGeom prst="roundRect">
@@ -3110,7 +3110,7 @@
         <p:spPr>
           <a:xfrm>
             <a:off x="448887" y="307571"/>
-            <a:ext cx="1574855" cy="584775"/>
+            <a:ext cx="3677160" cy="584775"/>
           </a:xfrm>
           <a:prstGeom prst="rect">
             <a:avLst/>
@@ -3124,10 +3124,14 @@
           <a:lstStyle/>
           <a:p>
             <a:r>
+              <a:rPr lang="en-US" altLang="zh-TW" sz="3200" dirty="0"/>
+              <a:t>Initialize </a:t>
+            </a:r>
+            <a:r>
               <a:rPr lang="en-US" altLang="zh-TW" sz="3200" dirty="0" smtClean="0"/>
-              <a:t>Initialize</a:t>
-            </a:r>
-            <a:endParaRPr lang="zh-TW" altLang="en-US" dirty="0"/>
+              <a:t>+ Re-paring</a:t>
+            </a:r>
+            <a:endParaRPr lang="en-US" altLang="zh-TW" sz="3200" dirty="0"/>
           </a:p>
         </p:txBody>
       </p:sp>
@@ -3139,7 +3143,7 @@
         </p:nvSpPr>
         <p:spPr>
           <a:xfrm>
-            <a:off x="3947558" y="1665961"/>
+            <a:off x="3292221" y="1427967"/>
             <a:ext cx="1712422" cy="798022"/>
           </a:xfrm>
           <a:prstGeom prst="roundRect">
@@ -3183,7 +3187,7 @@
         </p:nvSpPr>
         <p:spPr>
           <a:xfrm>
-            <a:off x="3203378" y="1886248"/>
+            <a:off x="2548041" y="1648254"/>
             <a:ext cx="357448" cy="357448"/>
           </a:xfrm>
           <a:prstGeom prst="mathPlus">
@@ -3223,8 +3227,8 @@
         </p:nvSpPr>
         <p:spPr>
           <a:xfrm rot="5400000">
-            <a:off x="6025930" y="1213802"/>
-            <a:ext cx="399012" cy="3374966"/>
+            <a:off x="5370592" y="-1474485"/>
+            <a:ext cx="399012" cy="8247138"/>
           </a:xfrm>
           <a:prstGeom prst="rightBrace">
             <a:avLst>
@@ -3265,7 +3269,7 @@
         </p:nvSpPr>
         <p:spPr>
           <a:xfrm>
-            <a:off x="5457200" y="3594041"/>
+            <a:off x="4801863" y="3356047"/>
             <a:ext cx="1536471" cy="1417320"/>
           </a:xfrm>
           <a:prstGeom prst="roundRect">
@@ -3309,8 +3313,8 @@
         </p:nvSpPr>
         <p:spPr>
           <a:xfrm>
-            <a:off x="7137341" y="3564059"/>
-            <a:ext cx="3862858" cy="1538883"/>
+            <a:off x="6338334" y="2737217"/>
+            <a:ext cx="4684570" cy="1846659"/>
           </a:xfrm>
           <a:prstGeom prst="rect">
             <a:avLst/>
@@ -3334,69 +3338,65 @@
           </a:p>
           <a:p>
             <a:r>
-              <a:rPr lang="en-US" altLang="zh-TW" sz="1400" dirty="0" smtClean="0"/>
+              <a:rPr lang="en-US" altLang="zh-TW" dirty="0" smtClean="0"/>
               <a:t>Hitcon</a:t>
             </a:r>
             <a:r>
-              <a:rPr lang="en-US" altLang="zh-TW" sz="1400" dirty="0"/>
+              <a:rPr lang="en-US" altLang="zh-TW" dirty="0"/>
               <a:t>://pair?v</a:t>
             </a:r>
             <a:r>
-              <a:rPr lang="en-US" altLang="zh-TW" sz="1400" dirty="0" smtClean="0"/>
+              <a:rPr lang="en-US" altLang="zh-TW" dirty="0" smtClean="0"/>
               <a:t>=</a:t>
             </a:r>
             <a:r>
-              <a:rPr lang="zh-TW" altLang="en-US" sz="1400" dirty="0" smtClean="0"/>
+              <a:rPr lang="zh-TW" altLang="en-US" dirty="0" smtClean="0"/>
               <a:t>版本數</a:t>
             </a:r>
-            <a:endParaRPr lang="en-US" altLang="zh-TW" sz="1400" dirty="0" smtClean="0"/>
-          </a:p>
-          <a:p>
-            <a:r>
-              <a:rPr lang="en-US" altLang="zh-TW" sz="1400" dirty="0" smtClean="0"/>
+            <a:endParaRPr lang="en-US" altLang="zh-TW" dirty="0" smtClean="0"/>
+          </a:p>
+          <a:p>
+            <a:r>
+              <a:rPr lang="en-US" altLang="zh-TW" dirty="0" smtClean="0"/>
               <a:t>&amp;a=</a:t>
             </a:r>
             <a:r>
-              <a:rPr lang="zh-TW" altLang="en-US" sz="1400" dirty="0" smtClean="0"/>
+              <a:rPr lang="zh-TW" altLang="en-US" dirty="0" smtClean="0"/>
               <a:t>錢包</a:t>
             </a:r>
             <a:r>
-              <a:rPr lang="en-US" altLang="zh-TW" sz="1400" dirty="0" smtClean="0"/>
+              <a:rPr lang="en-US" altLang="zh-TW" dirty="0" smtClean="0"/>
               <a:t>Address</a:t>
             </a:r>
           </a:p>
           <a:p>
             <a:r>
-              <a:rPr lang="en-US" altLang="zh-TW" sz="1400" dirty="0" smtClean="0"/>
+              <a:rPr lang="en-US" altLang="zh-TW" dirty="0" smtClean="0"/>
               <a:t>&amp;k=AES Key</a:t>
             </a:r>
           </a:p>
           <a:p>
             <a:r>
-              <a:rPr lang="en-US" altLang="zh-TW" sz="1400" dirty="0" smtClean="0"/>
-              <a:t>&amp;</a:t>
-            </a:r>
-            <a:r>
-              <a:rPr lang="en-US" altLang="zh-TW" sz="1400" dirty="0" smtClean="0"/>
-              <a:t>s=</a:t>
-            </a:r>
-            <a:r>
-              <a:rPr lang="en-US" altLang="zh-TW" sz="1400" dirty="0" err="1" smtClean="0"/>
+              <a:rPr lang="en-US" altLang="zh-TW" dirty="0" smtClean="0"/>
+              <a:t>&amp;s=</a:t>
+            </a:r>
+            <a:r>
+              <a:rPr lang="en-US" altLang="zh-TW" dirty="0" err="1" smtClean="0"/>
               <a:t>ServiceUUID</a:t>
             </a:r>
-            <a:endParaRPr lang="en-US" altLang="zh-TW" sz="1400" dirty="0" smtClean="0"/>
-          </a:p>
-          <a:p>
-            <a:r>
-              <a:rPr lang="en-US" altLang="zh-TW" sz="1400" dirty="0" smtClean="0"/>
+            <a:endParaRPr lang="en-US" altLang="zh-TW" dirty="0" smtClean="0"/>
+          </a:p>
+          <a:p>
+            <a:r>
+              <a:rPr lang="en-US" altLang="zh-TW" dirty="0" smtClean="0"/>
               <a:t>&amp;c=Characteristic</a:t>
             </a:r>
             <a:r>
-              <a:rPr lang="zh-TW" altLang="en-US" sz="1400" dirty="0" smtClean="0"/>
+              <a:rPr lang="zh-TW" altLang="en-US" dirty="0" smtClean="0"/>
               <a:t>前四個</a:t>
             </a:r>
             <a:r>
-              <a:rPr lang="en-US" altLang="zh-TW" sz="1400" dirty="0" smtClean="0"/>
+              <a:rPr lang="en-US" altLang="zh-TW" dirty="0" smtClean="0"/>
               <a:t>Byte[6]</a:t>
             </a:r>
           </a:p>
@@ -3410,7 +3410,7 @@
         </p:nvSpPr>
         <p:spPr>
           <a:xfrm>
-            <a:off x="1371599" y="3737599"/>
+            <a:off x="716262" y="3499605"/>
             <a:ext cx="2892829" cy="1200329"/>
           </a:xfrm>
           <a:prstGeom prst="rect">
@@ -3491,7 +3491,7 @@
         </p:nvSpPr>
         <p:spPr>
           <a:xfrm>
-            <a:off x="6046712" y="1881063"/>
+            <a:off x="5391375" y="1643069"/>
             <a:ext cx="357448" cy="357448"/>
           </a:xfrm>
           <a:prstGeom prst="mathPlus">
@@ -3531,7 +3531,7 @@
         </p:nvSpPr>
         <p:spPr>
           <a:xfrm>
-            <a:off x="9634226" y="1665961"/>
+            <a:off x="8978889" y="1427967"/>
             <a:ext cx="1712422" cy="798022"/>
           </a:xfrm>
           <a:prstGeom prst="roundRect">
@@ -3595,7 +3595,7 @@
         </p:nvSpPr>
         <p:spPr>
           <a:xfrm>
-            <a:off x="8890046" y="1881063"/>
+            <a:off x="8234709" y="1643069"/>
             <a:ext cx="357448" cy="357448"/>
           </a:xfrm>
           <a:prstGeom prst="mathPlus">
@@ -3635,62 +3635,64 @@
         </p:nvSpPr>
         <p:spPr>
           <a:xfrm>
-            <a:off x="7137341" y="5214927"/>
-            <a:ext cx="6096000" cy="1384995"/>
+            <a:off x="6338334" y="4523549"/>
+            <a:ext cx="5853666" cy="2031325"/>
           </a:xfrm>
           <a:prstGeom prst="rect">
             <a:avLst/>
           </a:prstGeom>
         </p:spPr>
         <p:txBody>
-          <a:bodyPr>
+          <a:bodyPr wrap="square">
             <a:spAutoFit/>
           </a:bodyPr>
           <a:lstStyle/>
           <a:p>
             <a:r>
-              <a:rPr lang="en-US" altLang="zh-TW" sz="1400" dirty="0" smtClean="0"/>
+              <a:rPr lang="en-US" altLang="zh-TW" dirty="0" smtClean="0"/>
               <a:t>Example:</a:t>
             </a:r>
           </a:p>
           <a:p>
             <a:r>
-              <a:rPr lang="en-US" altLang="zh-TW" sz="1400" dirty="0" smtClean="0"/>
-              <a:t>Hitcon</a:t>
-            </a:r>
-            <a:r>
-              <a:rPr lang="en-US" altLang="zh-TW" sz="1400" dirty="0"/>
-              <a:t>://?v=18</a:t>
-            </a:r>
-          </a:p>
-          <a:p>
-            <a:r>
-              <a:rPr lang="en-US" altLang="zh-TW" sz="1400" dirty="0"/>
-              <a:t>&amp;a=808c2257d778e5f1340d9325116f5a7273b33f5d</a:t>
-            </a:r>
-          </a:p>
-          <a:p>
-            <a:r>
-              <a:rPr lang="en-US" altLang="zh-TW" sz="1400" dirty="0"/>
-              <a:t>&amp;k=41e77dcd1d10df31d2f143b88e563693</a:t>
-            </a:r>
-          </a:p>
-          <a:p>
-            <a:r>
-              <a:rPr lang="en-US" altLang="zh-TW" sz="1400" dirty="0"/>
-              <a:t>&amp;</a:t>
-            </a:r>
-            <a:r>
-              <a:rPr lang="en-US" altLang="zh-TW" sz="1400" dirty="0"/>
-              <a:t>s=fcf2881e-110e-4dbb-d110-4ca507163e0b</a:t>
+              <a:rPr lang="en-US" altLang="zh-TW" dirty="0"/>
+              <a:t>hitcon://pair</a:t>
+            </a:r>
+            <a:r>
+              <a:rPr lang="en-US" altLang="zh-TW" dirty="0" smtClean="0"/>
+              <a:t>?</a:t>
+            </a:r>
+          </a:p>
+          <a:p>
+            <a:r>
+              <a:rPr lang="en-US" altLang="zh-TW" dirty="0" smtClean="0"/>
+              <a:t>v=18&amp;</a:t>
+            </a:r>
+          </a:p>
+          <a:p>
+            <a:r>
+              <a:rPr lang="en-US" altLang="zh-TW" dirty="0" smtClean="0"/>
+              <a:t>a=808c2257d778e5f1340d9325116f5a7273b33f5d&amp;</a:t>
+            </a:r>
+          </a:p>
+          <a:p>
+            <a:r>
+              <a:rPr lang="en-US" altLang="zh-TW" dirty="0" smtClean="0"/>
+              <a:t>k=09626aa096254e8a8ce871bfd7b8895c&amp;</a:t>
+            </a:r>
+          </a:p>
+          <a:p>
+            <a:r>
+              <a:rPr lang="en-US" altLang="zh-TW" dirty="0" smtClean="0"/>
+              <a:t>s=1cbfbb33-ffc7-c966-77f9-311c6ba9e425&amp;</a:t>
+            </a:r>
+          </a:p>
+          <a:p>
+            <a:r>
+              <a:rPr lang="en-US" altLang="zh-TW" dirty="0" smtClean="0"/>
+              <a:t>c=26ccce12e2c66a0b72c50cca509dbfc1275074f57e7c5668</a:t>
             </a:r>
             <a:endParaRPr lang="en-US" altLang="zh-TW" sz="1400" dirty="0"/>
-          </a:p>
-          <a:p>
-            <a:r>
-              <a:rPr lang="en-US" altLang="zh-TW" sz="1400" dirty="0"/>
-              <a:t>&amp;c=a3ae3cde7b5e9feff77a6f0dffb017590a5527c9e8a1dc52</a:t>
-            </a:r>
           </a:p>
         </p:txBody>
       </p:sp>
@@ -3702,7 +3704,7 @@
         </p:nvSpPr>
         <p:spPr>
           <a:xfrm>
-            <a:off x="6790892" y="1665961"/>
+            <a:off x="6135555" y="1427967"/>
             <a:ext cx="1712422" cy="798022"/>
           </a:xfrm>
           <a:prstGeom prst="roundRect">
@@ -3732,11 +3734,7 @@
             <a:pPr algn="ctr"/>
             <a:r>
               <a:rPr lang="en-US" altLang="zh-TW" dirty="0" smtClean="0"/>
-              <a:t>BLE Service </a:t>
-            </a:r>
-            <a:r>
-              <a:rPr lang="en-US" altLang="zh-TW" dirty="0" smtClean="0"/>
-              <a:t>UUID</a:t>
+              <a:t>BLE Service UUID</a:t>
             </a:r>
             <a:endParaRPr lang="zh-TW" altLang="en-US" dirty="0"/>
           </a:p>
@@ -3774,14 +3772,14 @@
       </p:grpSpPr>
       <p:sp>
         <p:nvSpPr>
-          <p:cNvPr id="2" name="圓角矩形 1"/>
+          <p:cNvPr id="8" name="圓角矩形 7"/>
           <p:cNvSpPr/>
           <p:nvPr/>
         </p:nvSpPr>
         <p:spPr>
           <a:xfrm>
-            <a:off x="1104224" y="1665961"/>
-            <a:ext cx="1712422" cy="798022"/>
+            <a:off x="4358897" y="2582041"/>
+            <a:ext cx="1536471" cy="1417320"/>
           </a:xfrm>
           <a:prstGeom prst="roundRect">
             <a:avLst/>
@@ -3810,7 +3808,14 @@
             <a:pPr algn="ctr"/>
             <a:r>
               <a:rPr lang="en-US" altLang="zh-TW" dirty="0" smtClean="0"/>
-              <a:t>Wallet Address</a:t>
+              <a:t>QR-Code</a:t>
+            </a:r>
+          </a:p>
+          <a:p>
+            <a:pPr algn="ctr"/>
+            <a:r>
+              <a:rPr lang="en-US" altLang="zh-TW" dirty="0" smtClean="0"/>
+              <a:t>generate</a:t>
             </a:r>
             <a:endParaRPr lang="zh-TW" altLang="en-US" dirty="0"/>
           </a:p>
@@ -3818,14 +3823,14 @@
       </p:sp>
       <p:sp>
         <p:nvSpPr>
-          <p:cNvPr id="3" name="文字方塊 2"/>
+          <p:cNvPr id="17" name="文字方塊 16"/>
           <p:cNvSpPr txBox="1"/>
           <p:nvPr/>
         </p:nvSpPr>
         <p:spPr>
           <a:xfrm>
             <a:off x="448887" y="307571"/>
-            <a:ext cx="1790042" cy="584775"/>
+            <a:ext cx="4456220" cy="584775"/>
           </a:xfrm>
           <a:prstGeom prst="rect">
             <a:avLst/>
@@ -3839,23 +3844,30 @@
           <a:lstStyle/>
           <a:p>
             <a:r>
+              <a:rPr lang="en-US" altLang="zh-TW" sz="3200" dirty="0"/>
+              <a:t>Initialize </a:t>
+            </a:r>
+            <a:r>
               <a:rPr lang="en-US" altLang="zh-TW" sz="3200" dirty="0" smtClean="0"/>
-              <a:t>Re-paring</a:t>
-            </a:r>
-            <a:endParaRPr lang="zh-TW" altLang="en-US" sz="3200" dirty="0" smtClean="0"/>
-          </a:p>
-        </p:txBody>
-      </p:sp>
-      <p:sp>
-        <p:nvSpPr>
-          <p:cNvPr id="4" name="圓角矩形 3"/>
+              <a:t>+ Re-paring </a:t>
+            </a:r>
+            <a:r>
+              <a:rPr lang="en-US" altLang="zh-TW" sz="3200" dirty="0"/>
+              <a:t>Flow</a:t>
+            </a:r>
+          </a:p>
+        </p:txBody>
+      </p:sp>
+      <p:sp>
+        <p:nvSpPr>
+          <p:cNvPr id="20" name="圓角矩形 19"/>
           <p:cNvSpPr/>
           <p:nvPr/>
         </p:nvSpPr>
         <p:spPr>
           <a:xfrm>
-            <a:off x="3947558" y="1665961"/>
-            <a:ext cx="1712422" cy="798022"/>
+            <a:off x="1327087" y="2582041"/>
+            <a:ext cx="1536471" cy="1417320"/>
           </a:xfrm>
           <a:prstGeom prst="roundRect">
             <a:avLst/>
@@ -3884,7 +3896,26 @@
             <a:pPr algn="ctr"/>
             <a:r>
               <a:rPr lang="en-US" altLang="zh-TW" dirty="0" smtClean="0"/>
-              <a:t>BLE AES Key</a:t>
+              <a:t>User Request for </a:t>
+            </a:r>
+            <a:r>
+              <a:rPr lang="en-US" altLang="zh-TW" dirty="0" err="1" smtClean="0"/>
+              <a:t>Reparing</a:t>
+            </a:r>
+            <a:r>
+              <a:rPr lang="en-US" altLang="zh-TW" dirty="0" smtClean="0"/>
+              <a:t> or</a:t>
+            </a:r>
+          </a:p>
+          <a:p>
+            <a:pPr algn="ctr"/>
+            <a:r>
+              <a:rPr lang="en-US" altLang="zh-TW" dirty="0" smtClean="0"/>
+              <a:t>First time </a:t>
+            </a:r>
+            <a:r>
+              <a:rPr lang="en-US" altLang="zh-TW" dirty="0" err="1" smtClean="0"/>
+              <a:t>config</a:t>
             </a:r>
             <a:endParaRPr lang="zh-TW" altLang="en-US" dirty="0"/>
           </a:p>
@@ -3892,16 +3923,96 @@
       </p:sp>
       <p:sp>
         <p:nvSpPr>
-          <p:cNvPr id="5" name="加號 4"/>
+          <p:cNvPr id="21" name="向右箭號 20"/>
           <p:cNvSpPr/>
           <p:nvPr/>
         </p:nvSpPr>
         <p:spPr>
           <a:xfrm>
-            <a:off x="3203378" y="1886248"/>
-            <a:ext cx="357448" cy="357448"/>
-          </a:xfrm>
-          <a:prstGeom prst="mathPlus">
+            <a:off x="2987867" y="3016190"/>
+            <a:ext cx="1252290" cy="549022"/>
+          </a:xfrm>
+          <a:prstGeom prst="rightArrow">
+            <a:avLst/>
+          </a:prstGeom>
+        </p:spPr>
+        <p:style>
+          <a:lnRef idx="3">
+            <a:schemeClr val="lt1"/>
+          </a:lnRef>
+          <a:fillRef idx="1">
+            <a:schemeClr val="accent4"/>
+          </a:fillRef>
+          <a:effectRef idx="1">
+            <a:schemeClr val="accent4"/>
+          </a:effectRef>
+          <a:fontRef idx="minor">
+            <a:schemeClr val="lt1"/>
+          </a:fontRef>
+        </p:style>
+        <p:txBody>
+          <a:bodyPr rtlCol="0" anchor="ctr"/>
+          <a:lstStyle/>
+          <a:p>
+            <a:pPr algn="ctr"/>
+            <a:r>
+              <a:rPr lang="en-US" altLang="zh-TW" dirty="0" smtClean="0"/>
+              <a:t>Reset</a:t>
+            </a:r>
+            <a:endParaRPr lang="zh-TW" altLang="en-US" dirty="0"/>
+          </a:p>
+        </p:txBody>
+      </p:sp>
+      <p:sp>
+        <p:nvSpPr>
+          <p:cNvPr id="22" name="向右箭號 21"/>
+          <p:cNvSpPr/>
+          <p:nvPr/>
+        </p:nvSpPr>
+        <p:spPr>
+          <a:xfrm>
+            <a:off x="6019676" y="3016190"/>
+            <a:ext cx="546209" cy="549022"/>
+          </a:xfrm>
+          <a:prstGeom prst="rightArrow">
+            <a:avLst/>
+          </a:prstGeom>
+        </p:spPr>
+        <p:style>
+          <a:lnRef idx="3">
+            <a:schemeClr val="lt1"/>
+          </a:lnRef>
+          <a:fillRef idx="1">
+            <a:schemeClr val="accent4"/>
+          </a:fillRef>
+          <a:effectRef idx="1">
+            <a:schemeClr val="accent4"/>
+          </a:effectRef>
+          <a:fontRef idx="minor">
+            <a:schemeClr val="lt1"/>
+          </a:fontRef>
+        </p:style>
+        <p:txBody>
+          <a:bodyPr rtlCol="0" anchor="ctr"/>
+          <a:lstStyle/>
+          <a:p>
+            <a:pPr algn="ctr"/>
+            <a:endParaRPr lang="zh-TW" altLang="en-US" dirty="0"/>
+          </a:p>
+        </p:txBody>
+      </p:sp>
+      <p:sp>
+        <p:nvSpPr>
+          <p:cNvPr id="23" name="圓角矩形 22"/>
+          <p:cNvSpPr/>
+          <p:nvPr/>
+        </p:nvSpPr>
+        <p:spPr>
+          <a:xfrm>
+            <a:off x="6679059" y="2582041"/>
+            <a:ext cx="1536471" cy="1417320"/>
+          </a:xfrm>
+          <a:prstGeom prst="roundRect">
             <a:avLst/>
           </a:prstGeom>
         </p:spPr>
@@ -3926,41 +4037,41 @@
           <a:lstStyle/>
           <a:p>
             <a:pPr algn="ctr"/>
-            <a:endParaRPr lang="zh-TW" altLang="en-US"/>
-          </a:p>
-        </p:txBody>
-      </p:sp>
-      <p:sp>
-        <p:nvSpPr>
-          <p:cNvPr id="7" name="右大括弧 6"/>
+            <a:r>
+              <a:rPr lang="en-US" altLang="zh-TW" dirty="0" smtClean="0"/>
+              <a:t>Wait for connection</a:t>
+            </a:r>
+            <a:endParaRPr lang="zh-TW" altLang="en-US" dirty="0"/>
+          </a:p>
+        </p:txBody>
+      </p:sp>
+      <p:sp>
+        <p:nvSpPr>
+          <p:cNvPr id="24" name="向右箭號 23"/>
           <p:cNvSpPr/>
           <p:nvPr/>
         </p:nvSpPr>
         <p:spPr>
-          <a:xfrm rot="5400000">
-            <a:off x="6025930" y="1213802"/>
-            <a:ext cx="399012" cy="3374966"/>
-          </a:xfrm>
-          <a:prstGeom prst="rightBrace">
-            <a:avLst>
-              <a:gd name="adj1" fmla="val 92360"/>
-              <a:gd name="adj2" fmla="val 49704"/>
-            </a:avLst>
-          </a:prstGeom>
-          <a:ln w="57150"/>
+          <a:xfrm>
+            <a:off x="8328704" y="3016190"/>
+            <a:ext cx="546209" cy="549022"/>
+          </a:xfrm>
+          <a:prstGeom prst="rightArrow">
+            <a:avLst/>
+          </a:prstGeom>
         </p:spPr>
         <p:style>
-          <a:lnRef idx="1">
-            <a:schemeClr val="accent1"/>
+          <a:lnRef idx="3">
+            <a:schemeClr val="lt1"/>
           </a:lnRef>
-          <a:fillRef idx="0">
-            <a:schemeClr val="accent1"/>
+          <a:fillRef idx="1">
+            <a:schemeClr val="accent4"/>
           </a:fillRef>
-          <a:effectRef idx="0">
-            <a:schemeClr val="accent1"/>
+          <a:effectRef idx="1">
+            <a:schemeClr val="accent4"/>
           </a:effectRef>
           <a:fontRef idx="minor">
-            <a:schemeClr val="tx1"/>
+            <a:schemeClr val="lt1"/>
           </a:fontRef>
         </p:style>
         <p:txBody>
@@ -3968,19 +4079,19 @@
           <a:lstStyle/>
           <a:p>
             <a:pPr algn="ctr"/>
-            <a:endParaRPr lang="zh-TW" altLang="en-US"/>
-          </a:p>
-        </p:txBody>
-      </p:sp>
-      <p:sp>
-        <p:nvSpPr>
-          <p:cNvPr id="8" name="圓角矩形 7"/>
+            <a:endParaRPr lang="zh-TW" altLang="en-US" dirty="0"/>
+          </a:p>
+        </p:txBody>
+      </p:sp>
+      <p:sp>
+        <p:nvSpPr>
+          <p:cNvPr id="25" name="圓角矩形 24"/>
           <p:cNvSpPr/>
           <p:nvPr/>
         </p:nvSpPr>
         <p:spPr>
           <a:xfrm>
-            <a:off x="5457200" y="3594041"/>
+            <a:off x="8988087" y="2582041"/>
             <a:ext cx="1536471" cy="1417320"/>
           </a:xfrm>
           <a:prstGeom prst="roundRect">
@@ -4010,7 +4121,7 @@
             <a:pPr algn="ctr"/>
             <a:r>
               <a:rPr lang="en-US" altLang="zh-TW" dirty="0" smtClean="0"/>
-              <a:t>QR-Code</a:t>
+              <a:t>Main Menu</a:t>
             </a:r>
             <a:endParaRPr lang="zh-TW" altLang="en-US" dirty="0"/>
           </a:p>
@@ -4018,14 +4129,14 @@
       </p:sp>
       <p:sp>
         <p:nvSpPr>
-          <p:cNvPr id="11" name="文字方塊 10"/>
+          <p:cNvPr id="6" name="文字方塊 5"/>
           <p:cNvSpPr txBox="1"/>
           <p:nvPr/>
         </p:nvSpPr>
         <p:spPr>
           <a:xfrm>
-            <a:off x="1371599" y="3737599"/>
-            <a:ext cx="2892829" cy="1200329"/>
+            <a:off x="2095322" y="4371584"/>
+            <a:ext cx="3392275" cy="646331"/>
           </a:xfrm>
           <a:prstGeom prst="rect">
             <a:avLst/>
@@ -4033,427 +4144,51 @@
           <a:noFill/>
         </p:spPr>
         <p:txBody>
-          <a:bodyPr wrap="square" rtlCol="0">
+          <a:bodyPr wrap="none" rtlCol="0">
             <a:spAutoFit/>
           </a:bodyPr>
           <a:lstStyle/>
           <a:p>
             <a:r>
+              <a:rPr lang="en-US" altLang="zh-TW" dirty="0" smtClean="0"/>
+              <a:t>MT7697</a:t>
+            </a:r>
+            <a:r>
               <a:rPr lang="zh-TW" altLang="en-US" dirty="0" smtClean="0"/>
-              <a:t>重新綁定的時候，</a:t>
+              <a:t>沒辦法 </a:t>
+            </a:r>
+            <a:r>
+              <a:rPr lang="en-US" altLang="zh-TW" dirty="0" smtClean="0"/>
+              <a:t>on-line</a:t>
+            </a:r>
+            <a:r>
+              <a:rPr lang="zh-TW" altLang="en-US" dirty="0" smtClean="0"/>
+              <a:t>修改</a:t>
+            </a:r>
+            <a:r>
+              <a:rPr lang="en-US" altLang="zh-TW" dirty="0" smtClean="0"/>
+              <a:t>BLE</a:t>
+            </a:r>
+            <a:r>
+              <a:rPr lang="zh-TW" altLang="en-US" dirty="0" smtClean="0"/>
+              <a:t>，</a:t>
             </a:r>
             <a:endParaRPr lang="en-US" altLang="zh-TW" dirty="0" smtClean="0"/>
           </a:p>
           <a:p>
             <a:r>
-              <a:rPr lang="en-US" altLang="zh-TW" dirty="0" smtClean="0"/>
-              <a:t>Badge</a:t>
-            </a:r>
-            <a:r>
               <a:rPr lang="zh-TW" altLang="en-US" dirty="0" smtClean="0"/>
-              <a:t>會將生成好的</a:t>
-            </a:r>
-            <a:r>
-              <a:rPr lang="en-US" altLang="zh-TW" dirty="0" smtClean="0"/>
-              <a:t>Public Address</a:t>
+              <a:t>所以必須</a:t>
+            </a:r>
+            <a:r>
+              <a:rPr lang="en-US" altLang="zh-TW" dirty="0" smtClean="0"/>
+              <a:t>Reset</a:t>
             </a:r>
             <a:r>
               <a:rPr lang="zh-TW" altLang="en-US" dirty="0" smtClean="0"/>
-              <a:t>和</a:t>
-            </a:r>
-            <a:r>
-              <a:rPr lang="en-US" altLang="zh-TW" dirty="0" smtClean="0"/>
-              <a:t>BLE</a:t>
-            </a:r>
-            <a:r>
-              <a:rPr lang="zh-TW" altLang="en-US" dirty="0" smtClean="0"/>
-              <a:t> </a:t>
-            </a:r>
-            <a:r>
-              <a:rPr lang="en-US" altLang="zh-TW" dirty="0" smtClean="0"/>
-              <a:t>Key</a:t>
-            </a:r>
-            <a:r>
-              <a:rPr lang="zh-TW" altLang="en-US" dirty="0" smtClean="0"/>
-              <a:t>打包成一個網址顯示在</a:t>
-            </a:r>
-            <a:r>
-              <a:rPr lang="en-US" altLang="zh-TW" dirty="0" smtClean="0"/>
-              <a:t>QR</a:t>
-            </a:r>
-            <a:r>
-              <a:rPr lang="zh-TW" altLang="en-US" dirty="0" smtClean="0"/>
-              <a:t> </a:t>
-            </a:r>
-            <a:r>
-              <a:rPr lang="en-US" altLang="zh-TW" dirty="0" smtClean="0"/>
-              <a:t>Code</a:t>
-            </a:r>
-            <a:r>
-              <a:rPr lang="zh-TW" altLang="en-US" dirty="0" smtClean="0"/>
-              <a:t>上面</a:t>
+              <a:t>一次</a:t>
             </a:r>
             <a:endParaRPr lang="zh-TW" altLang="en-US" dirty="0"/>
-          </a:p>
-        </p:txBody>
-      </p:sp>
-      <p:sp>
-        <p:nvSpPr>
-          <p:cNvPr id="13" name="圓角矩形 12"/>
-          <p:cNvSpPr/>
-          <p:nvPr/>
-        </p:nvSpPr>
-        <p:spPr>
-          <a:xfrm>
-            <a:off x="6790892" y="1665961"/>
-            <a:ext cx="1712422" cy="798022"/>
-          </a:xfrm>
-          <a:prstGeom prst="roundRect">
-            <a:avLst/>
-          </a:prstGeom>
-        </p:spPr>
-        <p:style>
-          <a:lnRef idx="2">
-            <a:schemeClr val="accent1">
-              <a:shade val="50000"/>
-            </a:schemeClr>
-          </a:lnRef>
-          <a:fillRef idx="1">
-            <a:schemeClr val="accent1"/>
-          </a:fillRef>
-          <a:effectRef idx="0">
-            <a:schemeClr val="accent1"/>
-          </a:effectRef>
-          <a:fontRef idx="minor">
-            <a:schemeClr val="lt1"/>
-          </a:fontRef>
-        </p:style>
-        <p:txBody>
-          <a:bodyPr rtlCol="0" anchor="ctr"/>
-          <a:lstStyle/>
-          <a:p>
-            <a:pPr algn="ctr"/>
-            <a:r>
-              <a:rPr lang="en-US" altLang="zh-TW" dirty="0" smtClean="0"/>
-              <a:t>BLE Service </a:t>
-            </a:r>
-            <a:r>
-              <a:rPr lang="en-US" altLang="zh-TW" dirty="0" smtClean="0"/>
-              <a:t>UUID</a:t>
-            </a:r>
-            <a:endParaRPr lang="zh-TW" altLang="en-US" dirty="0"/>
-          </a:p>
-        </p:txBody>
-      </p:sp>
-      <p:sp>
-        <p:nvSpPr>
-          <p:cNvPr id="14" name="加號 13"/>
-          <p:cNvSpPr/>
-          <p:nvPr/>
-        </p:nvSpPr>
-        <p:spPr>
-          <a:xfrm>
-            <a:off x="6046712" y="1881063"/>
-            <a:ext cx="357448" cy="357448"/>
-          </a:xfrm>
-          <a:prstGeom prst="mathPlus">
-            <a:avLst/>
-          </a:prstGeom>
-        </p:spPr>
-        <p:style>
-          <a:lnRef idx="2">
-            <a:schemeClr val="accent1">
-              <a:shade val="50000"/>
-            </a:schemeClr>
-          </a:lnRef>
-          <a:fillRef idx="1">
-            <a:schemeClr val="accent1"/>
-          </a:fillRef>
-          <a:effectRef idx="0">
-            <a:schemeClr val="accent1"/>
-          </a:effectRef>
-          <a:fontRef idx="minor">
-            <a:schemeClr val="lt1"/>
-          </a:fontRef>
-        </p:style>
-        <p:txBody>
-          <a:bodyPr rtlCol="0" anchor="ctr"/>
-          <a:lstStyle/>
-          <a:p>
-            <a:pPr algn="ctr"/>
-            <a:endParaRPr lang="zh-TW" altLang="en-US"/>
-          </a:p>
-        </p:txBody>
-      </p:sp>
-      <p:sp>
-        <p:nvSpPr>
-          <p:cNvPr id="15" name="圓角矩形 14"/>
-          <p:cNvSpPr/>
-          <p:nvPr/>
-        </p:nvSpPr>
-        <p:spPr>
-          <a:xfrm>
-            <a:off x="9634226" y="1665961"/>
-            <a:ext cx="1712422" cy="798022"/>
-          </a:xfrm>
-          <a:prstGeom prst="roundRect">
-            <a:avLst/>
-          </a:prstGeom>
-        </p:spPr>
-        <p:style>
-          <a:lnRef idx="2">
-            <a:schemeClr val="accent1">
-              <a:shade val="50000"/>
-            </a:schemeClr>
-          </a:lnRef>
-          <a:fillRef idx="1">
-            <a:schemeClr val="accent1"/>
-          </a:fillRef>
-          <a:effectRef idx="0">
-            <a:schemeClr val="accent1"/>
-          </a:effectRef>
-          <a:fontRef idx="minor">
-            <a:schemeClr val="lt1"/>
-          </a:fontRef>
-        </p:style>
-        <p:txBody>
-          <a:bodyPr rtlCol="0" anchor="ctr"/>
-          <a:lstStyle/>
-          <a:p>
-            <a:pPr algn="ctr"/>
-            <a:r>
-              <a:rPr lang="en-US" altLang="zh-TW" dirty="0" smtClean="0"/>
-              <a:t>BLE </a:t>
-            </a:r>
-            <a:r>
-              <a:rPr lang="zh-TW" altLang="en-US" dirty="0"/>
-              <a:t>各</a:t>
-            </a:r>
-            <a:r>
-              <a:rPr lang="en-US" altLang="zh-TW" dirty="0" err="1" smtClean="0"/>
-              <a:t>charastic</a:t>
-            </a:r>
-            <a:r>
-              <a:rPr lang="en-US" altLang="zh-TW" dirty="0" smtClean="0"/>
-              <a:t> UUID</a:t>
-            </a:r>
-            <a:r>
-              <a:rPr lang="zh-TW" altLang="en-US" dirty="0" smtClean="0"/>
-              <a:t>前</a:t>
-            </a:r>
-            <a:r>
-              <a:rPr lang="en-US" altLang="zh-TW" dirty="0" smtClean="0"/>
-              <a:t>4byte</a:t>
-            </a:r>
-            <a:endParaRPr lang="zh-TW" altLang="en-US" dirty="0"/>
-          </a:p>
-        </p:txBody>
-      </p:sp>
-      <p:sp>
-        <p:nvSpPr>
-          <p:cNvPr id="16" name="加號 15"/>
-          <p:cNvSpPr/>
-          <p:nvPr/>
-        </p:nvSpPr>
-        <p:spPr>
-          <a:xfrm>
-            <a:off x="8890046" y="1881063"/>
-            <a:ext cx="357448" cy="357448"/>
-          </a:xfrm>
-          <a:prstGeom prst="mathPlus">
-            <a:avLst/>
-          </a:prstGeom>
-        </p:spPr>
-        <p:style>
-          <a:lnRef idx="2">
-            <a:schemeClr val="accent1">
-              <a:shade val="50000"/>
-            </a:schemeClr>
-          </a:lnRef>
-          <a:fillRef idx="1">
-            <a:schemeClr val="accent1"/>
-          </a:fillRef>
-          <a:effectRef idx="0">
-            <a:schemeClr val="accent1"/>
-          </a:effectRef>
-          <a:fontRef idx="minor">
-            <a:schemeClr val="lt1"/>
-          </a:fontRef>
-        </p:style>
-        <p:txBody>
-          <a:bodyPr rtlCol="0" anchor="ctr"/>
-          <a:lstStyle/>
-          <a:p>
-            <a:pPr algn="ctr"/>
-            <a:endParaRPr lang="zh-TW" altLang="en-US"/>
-          </a:p>
-        </p:txBody>
-      </p:sp>
-      <p:sp>
-        <p:nvSpPr>
-          <p:cNvPr id="18" name="文字方塊 17"/>
-          <p:cNvSpPr txBox="1"/>
-          <p:nvPr/>
-        </p:nvSpPr>
-        <p:spPr>
-          <a:xfrm>
-            <a:off x="7137341" y="3564059"/>
-            <a:ext cx="3862858" cy="1538883"/>
-          </a:xfrm>
-          <a:prstGeom prst="rect">
-            <a:avLst/>
-          </a:prstGeom>
-          <a:noFill/>
-        </p:spPr>
-        <p:txBody>
-          <a:bodyPr wrap="square" rtlCol="0">
-            <a:spAutoFit/>
-          </a:bodyPr>
-          <a:lstStyle/>
-          <a:p>
-            <a:r>
-              <a:rPr lang="zh-TW" altLang="en-US" sz="2400" dirty="0" smtClean="0"/>
-              <a:t>格式</a:t>
-            </a:r>
-            <a:r>
-              <a:rPr lang="en-US" altLang="zh-TW" sz="2400" dirty="0" smtClean="0"/>
-              <a:t>:</a:t>
-            </a:r>
-          </a:p>
-          <a:p>
-            <a:r>
-              <a:rPr lang="en-US" altLang="zh-TW" sz="1400" dirty="0" smtClean="0"/>
-              <a:t>Hitcon</a:t>
-            </a:r>
-            <a:r>
-              <a:rPr lang="en-US" altLang="zh-TW" sz="1400" dirty="0"/>
-              <a:t>://pair?v</a:t>
-            </a:r>
-            <a:r>
-              <a:rPr lang="en-US" altLang="zh-TW" sz="1400" dirty="0" smtClean="0"/>
-              <a:t>=</a:t>
-            </a:r>
-            <a:r>
-              <a:rPr lang="zh-TW" altLang="en-US" sz="1400" dirty="0" smtClean="0"/>
-              <a:t>版本數</a:t>
-            </a:r>
-            <a:endParaRPr lang="en-US" altLang="zh-TW" sz="1400" dirty="0" smtClean="0"/>
-          </a:p>
-          <a:p>
-            <a:r>
-              <a:rPr lang="en-US" altLang="zh-TW" sz="1400" dirty="0" smtClean="0"/>
-              <a:t>&amp;a=</a:t>
-            </a:r>
-            <a:r>
-              <a:rPr lang="zh-TW" altLang="en-US" sz="1400" dirty="0" smtClean="0"/>
-              <a:t>錢包</a:t>
-            </a:r>
-            <a:r>
-              <a:rPr lang="en-US" altLang="zh-TW" sz="1400" dirty="0" smtClean="0"/>
-              <a:t>Address</a:t>
-            </a:r>
-          </a:p>
-          <a:p>
-            <a:r>
-              <a:rPr lang="en-US" altLang="zh-TW" sz="1400" dirty="0" smtClean="0"/>
-              <a:t>&amp;k=AES Key</a:t>
-            </a:r>
-          </a:p>
-          <a:p>
-            <a:r>
-              <a:rPr lang="en-US" altLang="zh-TW" sz="1400" dirty="0" smtClean="0"/>
-              <a:t>&amp;</a:t>
-            </a:r>
-            <a:r>
-              <a:rPr lang="en-US" altLang="zh-TW" sz="1400" dirty="0" smtClean="0"/>
-              <a:t>s=</a:t>
-            </a:r>
-            <a:r>
-              <a:rPr lang="en-US" altLang="zh-TW" sz="1400" dirty="0" err="1" smtClean="0"/>
-              <a:t>ServiceUUID</a:t>
-            </a:r>
-            <a:endParaRPr lang="en-US" altLang="zh-TW" sz="1400" dirty="0" smtClean="0"/>
-          </a:p>
-          <a:p>
-            <a:r>
-              <a:rPr lang="en-US" altLang="zh-TW" sz="1400" dirty="0" smtClean="0"/>
-              <a:t>&amp;c=Characteristic</a:t>
-            </a:r>
-            <a:r>
-              <a:rPr lang="zh-TW" altLang="en-US" sz="1400" dirty="0" smtClean="0"/>
-              <a:t>前四個</a:t>
-            </a:r>
-            <a:r>
-              <a:rPr lang="en-US" altLang="zh-TW" sz="1400" dirty="0" smtClean="0"/>
-              <a:t>Byte[6]</a:t>
-            </a:r>
-          </a:p>
-        </p:txBody>
-      </p:sp>
-      <p:sp>
-        <p:nvSpPr>
-          <p:cNvPr id="19" name="矩形 18"/>
-          <p:cNvSpPr/>
-          <p:nvPr/>
-        </p:nvSpPr>
-        <p:spPr>
-          <a:xfrm>
-            <a:off x="7137341" y="5214927"/>
-            <a:ext cx="6096000" cy="1384995"/>
-          </a:xfrm>
-          <a:prstGeom prst="rect">
-            <a:avLst/>
-          </a:prstGeom>
-        </p:spPr>
-        <p:txBody>
-          <a:bodyPr>
-            <a:spAutoFit/>
-          </a:bodyPr>
-          <a:lstStyle/>
-          <a:p>
-            <a:r>
-              <a:rPr lang="en-US" altLang="zh-TW" sz="1400" dirty="0" smtClean="0"/>
-              <a:t>Example:</a:t>
-            </a:r>
-          </a:p>
-          <a:p>
-            <a:r>
-              <a:rPr lang="en-US" altLang="zh-TW" sz="1400" dirty="0" smtClean="0"/>
-              <a:t>Hitcon</a:t>
-            </a:r>
-            <a:r>
-              <a:rPr lang="en-US" altLang="zh-TW" sz="1400" dirty="0"/>
-              <a:t>://?v=18</a:t>
-            </a:r>
-          </a:p>
-          <a:p>
-            <a:r>
-              <a:rPr lang="en-US" altLang="zh-TW" sz="1400" dirty="0"/>
-              <a:t>&amp;a=808c2257d778e5f1340d9325116f5a7273b33f5d</a:t>
-            </a:r>
-          </a:p>
-          <a:p>
-            <a:r>
-              <a:rPr lang="en-US" altLang="zh-TW" sz="1400" dirty="0"/>
-              <a:t>&amp;k=41e77dcd1d10df31d2f143b88e563693</a:t>
-            </a:r>
-          </a:p>
-          <a:p>
-            <a:r>
-              <a:rPr lang="en-US" altLang="zh-TW" sz="1400" dirty="0"/>
-              <a:t>&amp;</a:t>
-            </a:r>
-            <a:r>
-              <a:rPr lang="en-US" altLang="zh-TW" sz="1400" dirty="0"/>
-              <a:t>s=fcf2881e-110e-4dbb-d110-4ca507163e0b</a:t>
-            </a:r>
-            <a:endParaRPr lang="en-US" altLang="zh-TW" sz="1400" dirty="0"/>
-          </a:p>
-          <a:p>
-            <a:r>
-              <a:rPr lang="en-US" altLang="zh-TW" sz="1400" dirty="0"/>
-              <a:t>&amp;c=a3ae3cde7b5e9feff77a6f0dffb017590a5527c9e8a1dc52</a:t>
-            </a:r>
           </a:p>
         </p:txBody>
       </p:sp>
@@ -4568,11 +4303,7 @@
             </a:r>
             <a:r>
               <a:rPr lang="zh-TW" altLang="en-US" sz="2400" dirty="0" smtClean="0"/>
-              <a:t>會</a:t>
-            </a:r>
-            <a:r>
-              <a:rPr lang="zh-TW" altLang="en-US" sz="2400" dirty="0" smtClean="0"/>
-              <a:t>寫</a:t>
+              <a:t>會寫</a:t>
             </a:r>
             <a:r>
               <a:rPr lang="en-US" altLang="zh-TW" sz="2400" dirty="0"/>
@@ -5796,8 +5527,13 @@
             <a:pPr algn="ctr"/>
             <a:r>
               <a:rPr lang="en-US" altLang="zh-TW" dirty="0" smtClean="0"/>
-              <a:t>Badge notify by </a:t>
-            </a:r>
+              <a:t>Badge </a:t>
+            </a:r>
+            <a:r>
+              <a:rPr lang="en-US" altLang="zh-TW" dirty="0" smtClean="0"/>
+              <a:t>notify</a:t>
+            </a:r>
+            <a:endParaRPr lang="en-US" altLang="zh-TW" dirty="0" smtClean="0"/>
           </a:p>
           <a:p>
             <a:pPr algn="ctr"/>
@@ -6871,7 +6607,7 @@
             </a:r>
             <a:r>
               <a:rPr lang="en-US" altLang="zh-TW" dirty="0" smtClean="0"/>
-              <a:t>0x04</a:t>
+              <a:t>0x08</a:t>
             </a:r>
             <a:r>
               <a:rPr lang="en-US" altLang="zh-TW" dirty="0"/>
@@ -6881,7 +6617,6 @@
               <a:rPr lang="en-US" altLang="zh-TW" dirty="0" smtClean="0"/>
               <a:t>	Value</a:t>
             </a:r>
-            <a:endParaRPr lang="en-US" altLang="zh-TW" dirty="0" smtClean="0"/>
           </a:p>
         </p:txBody>
       </p:sp>
@@ -7057,8 +6792,8 @@
         </p:nvSpPr>
         <p:spPr>
           <a:xfrm>
-            <a:off x="659607" y="4915462"/>
-            <a:ext cx="3159839" cy="369332"/>
+            <a:off x="526974" y="5053961"/>
+            <a:ext cx="2822376" cy="461665"/>
           </a:xfrm>
           <a:prstGeom prst="rect">
             <a:avLst/>
@@ -7071,34 +6806,22 @@
           <a:lstStyle/>
           <a:p>
             <a:r>
-              <a:rPr lang="en-US" altLang="zh-TW" dirty="0" smtClean="0"/>
-              <a:t>Value = </a:t>
-            </a:r>
-            <a:r>
-              <a:rPr lang="zh-TW" altLang="en-US" dirty="0" smtClean="0"/>
-              <a:t>四位</a:t>
-            </a:r>
-            <a:r>
-              <a:rPr lang="en-US" altLang="zh-TW" dirty="0" smtClean="0"/>
-              <a:t>ASCII</a:t>
-            </a:r>
-            <a:r>
-              <a:rPr lang="zh-TW" altLang="en-US" dirty="0" smtClean="0"/>
-              <a:t>的數字</a:t>
-            </a:r>
-            <a:r>
-              <a:rPr lang="en-US" altLang="zh-TW" dirty="0" smtClean="0"/>
-              <a:t>(</a:t>
-            </a:r>
-            <a:r>
-              <a:rPr lang="zh-TW" altLang="en-US" dirty="0" smtClean="0"/>
-              <a:t>暫定</a:t>
-            </a:r>
-            <a:r>
-              <a:rPr lang="en-US" altLang="zh-TW" dirty="0" smtClean="0"/>
-              <a:t>)</a:t>
-            </a:r>
-            <a:endParaRPr lang="zh-TW" altLang="en-US" dirty="0"/>
+              <a:rPr lang="en-US" altLang="zh-TW" sz="2400" dirty="0" smtClean="0"/>
+              <a:t>Type(value) = </a:t>
+            </a:r>
+            <a:r>
+              <a:rPr lang="en-US" altLang="zh-TW" sz="2400" dirty="0" smtClean="0">
+                <a:solidFill>
+                  <a:srgbClr val="FF0000"/>
+                </a:solidFill>
+              </a:rPr>
+              <a:t>Double</a:t>
+            </a:r>
+            <a:endParaRPr lang="zh-TW" altLang="en-US" sz="2400" dirty="0">
+              <a:solidFill>
+                <a:srgbClr val="FF0000"/>
+              </a:solidFill>
+            </a:endParaRPr>
           </a:p>
         </p:txBody>
       </p:sp>
@@ -7309,8 +7032,8 @@
               <a:t>0x02	</a:t>
             </a:r>
             <a:r>
-              <a:rPr lang="en-US" altLang="zh-TW" dirty="0" err="1" smtClean="0"/>
-              <a:t>Value_len</a:t>
+              <a:rPr lang="en-US" altLang="zh-TW" dirty="0" smtClean="0"/>
+              <a:t>0x08</a:t>
             </a:r>
             <a:r>
               <a:rPr lang="en-US" altLang="zh-TW" dirty="0"/>
@@ -7494,14 +7217,14 @@
       </p:sp>
       <p:sp>
         <p:nvSpPr>
-          <p:cNvPr id="12" name="矩形 11"/>
+          <p:cNvPr id="13" name="矩形 12"/>
           <p:cNvSpPr/>
           <p:nvPr/>
         </p:nvSpPr>
         <p:spPr>
           <a:xfrm>
-            <a:off x="659607" y="4915462"/>
-            <a:ext cx="3159839" cy="369332"/>
+            <a:off x="526974" y="5053961"/>
+            <a:ext cx="2822376" cy="461665"/>
           </a:xfrm>
           <a:prstGeom prst="rect">
             <a:avLst/>
@@ -7514,34 +7237,22 @@
           <a:lstStyle/>
           <a:p>
             <a:r>
-              <a:rPr lang="en-US" altLang="zh-TW" dirty="0" smtClean="0"/>
-              <a:t>Value = </a:t>
-            </a:r>
-            <a:r>
-              <a:rPr lang="zh-TW" altLang="en-US" dirty="0" smtClean="0"/>
-              <a:t>四位</a:t>
-            </a:r>
-            <a:r>
-              <a:rPr lang="en-US" altLang="zh-TW" dirty="0" smtClean="0"/>
-              <a:t>ASCII</a:t>
-            </a:r>
-            <a:r>
-              <a:rPr lang="zh-TW" altLang="en-US" dirty="0" smtClean="0"/>
-              <a:t>的數字</a:t>
-            </a:r>
-            <a:r>
-              <a:rPr lang="en-US" altLang="zh-TW" dirty="0" smtClean="0"/>
-              <a:t>(</a:t>
-            </a:r>
-            <a:r>
-              <a:rPr lang="zh-TW" altLang="en-US" dirty="0" smtClean="0"/>
-              <a:t>暫定</a:t>
-            </a:r>
-            <a:r>
-              <a:rPr lang="en-US" altLang="zh-TW" dirty="0" smtClean="0"/>
-              <a:t>)</a:t>
-            </a:r>
-            <a:endParaRPr lang="zh-TW" altLang="en-US" dirty="0"/>
+              <a:rPr lang="en-US" altLang="zh-TW" sz="2400" dirty="0" smtClean="0"/>
+              <a:t>Type(value) = </a:t>
+            </a:r>
+            <a:r>
+              <a:rPr lang="en-US" altLang="zh-TW" sz="2400" dirty="0" smtClean="0">
+                <a:solidFill>
+                  <a:srgbClr val="FF0000"/>
+                </a:solidFill>
+              </a:rPr>
+              <a:t>Double</a:t>
+            </a:r>
+            <a:endParaRPr lang="zh-TW" altLang="en-US" sz="2400" dirty="0">
+              <a:solidFill>
+                <a:srgbClr val="FF0000"/>
+              </a:solidFill>
+            </a:endParaRPr>
           </a:p>
         </p:txBody>
       </p:sp>

</xml_diff>